<commit_message>
Further progress on presentation
Just waiting on remaining pseudocode and demo video.
</commit_message>
<xml_diff>
--- a/Design and Pseudocode Materials/Major Project Presentation.pptx
+++ b/Design and Pseudocode Materials/Major Project Presentation.pptx
@@ -5,29 +5,31 @@
     <p:sldMasterId id="2147483672" r:id="rId1"/>
   </p:sldMasterIdLst>
   <p:notesMasterIdLst>
-    <p:notesMasterId r:id="rId19"/>
+    <p:notesMasterId r:id="rId21"/>
   </p:notesMasterIdLst>
   <p:handoutMasterIdLst>
-    <p:handoutMasterId r:id="rId20"/>
+    <p:handoutMasterId r:id="rId22"/>
   </p:handoutMasterIdLst>
   <p:sldIdLst>
     <p:sldId id="256" r:id="rId2"/>
     <p:sldId id="261" r:id="rId3"/>
     <p:sldId id="262" r:id="rId4"/>
-    <p:sldId id="273" r:id="rId5"/>
-    <p:sldId id="264" r:id="rId6"/>
-    <p:sldId id="274" r:id="rId7"/>
-    <p:sldId id="272" r:id="rId8"/>
-    <p:sldId id="263" r:id="rId9"/>
-    <p:sldId id="265" r:id="rId10"/>
-    <p:sldId id="276" r:id="rId11"/>
-    <p:sldId id="267" r:id="rId12"/>
-    <p:sldId id="268" r:id="rId13"/>
-    <p:sldId id="269" r:id="rId14"/>
-    <p:sldId id="270" r:id="rId15"/>
-    <p:sldId id="271" r:id="rId16"/>
-    <p:sldId id="275" r:id="rId17"/>
-    <p:sldId id="260" r:id="rId18"/>
+    <p:sldId id="277" r:id="rId5"/>
+    <p:sldId id="273" r:id="rId6"/>
+    <p:sldId id="264" r:id="rId7"/>
+    <p:sldId id="274" r:id="rId8"/>
+    <p:sldId id="272" r:id="rId9"/>
+    <p:sldId id="263" r:id="rId10"/>
+    <p:sldId id="265" r:id="rId11"/>
+    <p:sldId id="276" r:id="rId12"/>
+    <p:sldId id="267" r:id="rId13"/>
+    <p:sldId id="268" r:id="rId14"/>
+    <p:sldId id="269" r:id="rId15"/>
+    <p:sldId id="270" r:id="rId16"/>
+    <p:sldId id="271" r:id="rId17"/>
+    <p:sldId id="275" r:id="rId18"/>
+    <p:sldId id="260" r:id="rId19"/>
+    <p:sldId id="278" r:id="rId20"/>
   </p:sldIdLst>
   <p:sldSz cx="12192000" cy="6858000"/>
   <p:notesSz cx="6858000" cy="9144000"/>
@@ -231,7 +233,7 @@
           <a:p>
             <a:fld id="{AF869721-F543-4A6C-BF9D-65D7CC540427}" type="datetimeFigureOut">
               <a:rPr lang="en-US" smtClean="0"/>
-              <a:t>5/23/2022</a:t>
+              <a:t>5/24/2022</a:t>
             </a:fld>
             <a:endParaRPr lang="en-US" dirty="0"/>
           </a:p>
@@ -408,7 +410,7 @@
           <a:p>
             <a:fld id="{C732326A-4C88-4AFB-AA5B-5919D81DFF5B}" type="datetimeFigureOut">
               <a:rPr lang="en-US" smtClean="0"/>
-              <a:t>5/23/2022</a:t>
+              <a:t>5/24/2022</a:t>
             </a:fld>
             <a:endParaRPr lang="en-US" dirty="0"/>
           </a:p>
@@ -824,7 +826,7 @@
           <a:p>
             <a:fld id="{C6B3AB32-59DF-41F1-9618-EDFBF5049629}" type="slidenum">
               <a:rPr lang="en-US" smtClean="0"/>
-              <a:t>17</a:t>
+              <a:t>18</a:t>
             </a:fld>
             <a:endParaRPr lang="en-US" dirty="0"/>
           </a:p>
@@ -1089,7 +1091,7 @@
             <a:fld id="{B61BEF0D-F0BB-DE4B-95CE-6DB70DBA9567}" type="datetimeFigureOut">
               <a:rPr lang="en-US" smtClean="0"/>
               <a:pPr/>
-              <a:t>5/23/2022</a:t>
+              <a:t>5/24/2022</a:t>
             </a:fld>
             <a:endParaRPr lang="en-US" dirty="0"/>
           </a:p>
@@ -1353,7 +1355,7 @@
             <a:fld id="{B61BEF0D-F0BB-DE4B-95CE-6DB70DBA9567}" type="datetimeFigureOut">
               <a:rPr lang="en-US" smtClean="0"/>
               <a:pPr/>
-              <a:t>5/23/2022</a:t>
+              <a:t>5/24/2022</a:t>
             </a:fld>
             <a:endParaRPr lang="en-US" dirty="0"/>
           </a:p>
@@ -1590,7 +1592,7 @@
             <a:fld id="{B61BEF0D-F0BB-DE4B-95CE-6DB70DBA9567}" type="datetimeFigureOut">
               <a:rPr lang="en-US" smtClean="0"/>
               <a:pPr/>
-              <a:t>5/23/2022</a:t>
+              <a:t>5/24/2022</a:t>
             </a:fld>
             <a:endParaRPr lang="en-US" dirty="0"/>
           </a:p>
@@ -1832,7 +1834,7 @@
             <a:fld id="{B61BEF0D-F0BB-DE4B-95CE-6DB70DBA9567}" type="datetimeFigureOut">
               <a:rPr lang="en-US" smtClean="0"/>
               <a:pPr/>
-              <a:t>5/23/2022</a:t>
+              <a:t>5/24/2022</a:t>
             </a:fld>
             <a:endParaRPr lang="en-US" dirty="0"/>
           </a:p>
@@ -2141,7 +2143,7 @@
             <a:fld id="{B61BEF0D-F0BB-DE4B-95CE-6DB70DBA9567}" type="datetimeFigureOut">
               <a:rPr lang="en-US" smtClean="0"/>
               <a:pPr/>
-              <a:t>5/23/2022</a:t>
+              <a:t>5/24/2022</a:t>
             </a:fld>
             <a:endParaRPr lang="en-US" dirty="0"/>
           </a:p>
@@ -2445,7 +2447,7 @@
             <a:fld id="{B61BEF0D-F0BB-DE4B-95CE-6DB70DBA9567}" type="datetimeFigureOut">
               <a:rPr lang="en-US" smtClean="0"/>
               <a:pPr/>
-              <a:t>5/23/2022</a:t>
+              <a:t>5/24/2022</a:t>
             </a:fld>
             <a:endParaRPr lang="en-US" dirty="0"/>
           </a:p>
@@ -2869,7 +2871,7 @@
             <a:fld id="{B61BEF0D-F0BB-DE4B-95CE-6DB70DBA9567}" type="datetimeFigureOut">
               <a:rPr lang="en-US" smtClean="0"/>
               <a:pPr/>
-              <a:t>5/23/2022</a:t>
+              <a:t>5/24/2022</a:t>
             </a:fld>
             <a:endParaRPr lang="en-US" dirty="0"/>
           </a:p>
@@ -2966,7 +2968,7 @@
             <a:fld id="{B61BEF0D-F0BB-DE4B-95CE-6DB70DBA9567}" type="datetimeFigureOut">
               <a:rPr lang="en-US" smtClean="0"/>
               <a:pPr/>
-              <a:t>5/23/2022</a:t>
+              <a:t>5/24/2022</a:t>
             </a:fld>
             <a:endParaRPr lang="en-US" dirty="0"/>
           </a:p>
@@ -3130,7 +3132,7 @@
             <a:fld id="{B61BEF0D-F0BB-DE4B-95CE-6DB70DBA9567}" type="datetimeFigureOut">
               <a:rPr lang="en-US" smtClean="0"/>
               <a:pPr/>
-              <a:t>5/23/2022</a:t>
+              <a:t>5/24/2022</a:t>
             </a:fld>
             <a:endParaRPr lang="en-US" dirty="0"/>
           </a:p>
@@ -3510,7 +3512,7 @@
             <a:fld id="{B61BEF0D-F0BB-DE4B-95CE-6DB70DBA9567}" type="datetimeFigureOut">
               <a:rPr lang="en-US" smtClean="0"/>
               <a:pPr/>
-              <a:t>5/23/2022</a:t>
+              <a:t>5/24/2022</a:t>
             </a:fld>
             <a:endParaRPr lang="en-US" dirty="0"/>
           </a:p>
@@ -3801,7 +3803,7 @@
             <a:fld id="{B61BEF0D-F0BB-DE4B-95CE-6DB70DBA9567}" type="datetimeFigureOut">
               <a:rPr lang="en-US" smtClean="0"/>
               <a:pPr/>
-              <a:t>5/23/2022</a:t>
+              <a:t>5/24/2022</a:t>
             </a:fld>
             <a:endParaRPr lang="en-US" dirty="0"/>
           </a:p>
@@ -4014,7 +4016,7 @@
             <a:fld id="{B61BEF0D-F0BB-DE4B-95CE-6DB70DBA9567}" type="datetimeFigureOut">
               <a:rPr lang="en-US" smtClean="0"/>
               <a:pPr/>
-              <a:t>5/23/2022</a:t>
+              <a:t>5/24/2022</a:t>
             </a:fld>
             <a:endParaRPr lang="en-US" dirty="0"/>
           </a:p>
@@ -5076,7 +5078,7 @@
           <p:cNvPr id="2" name="Title 1">
             <a:extLst>
               <a:ext uri="{FF2B5EF4-FFF2-40B4-BE49-F238E27FC236}">
-                <a16:creationId xmlns:a16="http://schemas.microsoft.com/office/drawing/2014/main" id="{74FFB04B-03C3-FC82-7270-42C9D581FDAB}"/>
+                <a16:creationId xmlns:a16="http://schemas.microsoft.com/office/drawing/2014/main" id="{6DA39524-6704-D260-3946-C5F2AF0D6D79}"/>
               </a:ext>
             </a:extLst>
           </p:cNvPr>
@@ -5094,13 +5096,8 @@
           <a:p>
             <a:r>
               <a:rPr lang="en-AU" dirty="0"/>
-              <a:t>Serial Module </a:t>
-            </a:r>
-            <a:r>
-              <a:rPr lang="en-AU" dirty="0" err="1"/>
-              <a:t>PSEUdoCode</a:t>
-            </a:r>
-            <a:endParaRPr lang="en-AU" dirty="0"/>
+              <a:t>Roles and Responsibilities </a:t>
+            </a:r>
           </a:p>
         </p:txBody>
       </p:sp>
@@ -5109,7 +5106,7 @@
           <p:cNvPr id="3" name="Content Placeholder 2">
             <a:extLst>
               <a:ext uri="{FF2B5EF4-FFF2-40B4-BE49-F238E27FC236}">
-                <a16:creationId xmlns:a16="http://schemas.microsoft.com/office/drawing/2014/main" id="{0EBF9320-EB38-2A17-003E-330D32C5491B}"/>
+                <a16:creationId xmlns:a16="http://schemas.microsoft.com/office/drawing/2014/main" id="{539B4EA0-6377-956A-38C4-EECB0B2BAD94}"/>
               </a:ext>
             </a:extLst>
           </p:cNvPr>
@@ -5122,91 +5119,483 @@
         </p:nvSpPr>
         <p:spPr/>
         <p:txBody>
-          <a:bodyPr>
-            <a:normAutofit lnSpcReduction="10000"/>
-          </a:bodyPr>
+          <a:bodyPr anchor="t"/>
           <a:lstStyle/>
           <a:p>
             <a:pPr marL="0" indent="0">
               <a:buNone/>
             </a:pPr>
             <a:r>
-              <a:rPr lang="en-GB" sz="1400" b="1" dirty="0"/>
-              <a:t>Serial Output</a:t>
-            </a:r>
-          </a:p>
-          <a:p>
-            <a:r>
-              <a:rPr lang="en-GB" sz="1400" dirty="0"/>
-              <a:t>Function called</a:t>
-            </a:r>
-          </a:p>
-          <a:p>
-            <a:r>
-              <a:rPr lang="en-GB" sz="1400" dirty="0"/>
-              <a:t>Load argument into buffer and end buffer with null</a:t>
-            </a:r>
-          </a:p>
-          <a:p>
-            <a:r>
-              <a:rPr lang="en-GB" sz="1400" dirty="0"/>
-              <a:t>Update message to send bit/register to true</a:t>
-            </a:r>
-          </a:p>
-          <a:p>
-            <a:r>
-              <a:rPr lang="en-GB" sz="1400" dirty="0"/>
-              <a:t>Check whether terminal ready to receive</a:t>
-            </a:r>
-          </a:p>
-          <a:p>
-            <a:r>
-              <a:rPr lang="en-GB" sz="1400" dirty="0"/>
-              <a:t>If ready to receive, transmit character by character until null reached Update message to send bit/register to false</a:t>
-            </a:r>
-          </a:p>
-          <a:p>
-            <a:r>
-              <a:rPr lang="en-GB" sz="1400" dirty="0"/>
-              <a:t>Clear buffer </a:t>
+              <a:rPr lang="en-AU" dirty="0"/>
+              <a:t>Roles for this project were spread evenly among the group, with each member acting as the primary for one module.</a:t>
             </a:r>
           </a:p>
           <a:p>
             <a:pPr marL="0" indent="0">
               <a:buNone/>
             </a:pPr>
-            <a:r>
-              <a:rPr lang="en-GB" sz="1400" b="1" dirty="0"/>
-              <a:t>Serial Input</a:t>
-            </a:r>
-          </a:p>
-          <a:p>
-            <a:r>
-              <a:rPr lang="en-GB" sz="1400" dirty="0"/>
-              <a:t>If receive interrupt triggered </a:t>
-            </a:r>
-          </a:p>
-          <a:p>
-            <a:r>
-              <a:rPr lang="en-GB" sz="1400" dirty="0"/>
-              <a:t>While message waiting to be received, read character by character into buffer</a:t>
-            </a:r>
-          </a:p>
-          <a:p>
-            <a:r>
-              <a:rPr lang="en-GB" sz="1400" dirty="0"/>
-              <a:t>Update message to receive bit/register to false once null character received</a:t>
-            </a:r>
-          </a:p>
-          <a:p>
             <a:endParaRPr lang="en-AU" dirty="0"/>
           </a:p>
         </p:txBody>
       </p:sp>
+      <p:graphicFrame>
+        <p:nvGraphicFramePr>
+          <p:cNvPr id="4" name="Table 4">
+            <a:extLst>
+              <a:ext uri="{FF2B5EF4-FFF2-40B4-BE49-F238E27FC236}">
+                <a16:creationId xmlns:a16="http://schemas.microsoft.com/office/drawing/2014/main" id="{3418FF52-86B3-557B-4765-2D4C13089BCD}"/>
+              </a:ext>
+            </a:extLst>
+          </p:cNvPr>
+          <p:cNvGraphicFramePr>
+            <a:graphicFrameLocks noGrp="1"/>
+          </p:cNvGraphicFramePr>
+          <p:nvPr>
+            <p:extLst>
+              <p:ext uri="{D42A27DB-BD31-4B8C-83A1-F6EECF244321}">
+                <p14:modId xmlns:p14="http://schemas.microsoft.com/office/powerpoint/2010/main" val="3120661825"/>
+              </p:ext>
+            </p:extLst>
+          </p:nvPr>
+        </p:nvGraphicFramePr>
+        <p:xfrm>
+          <a:off x="2031999" y="2721707"/>
+          <a:ext cx="8128000" cy="3134360"/>
+        </p:xfrm>
+        <a:graphic>
+          <a:graphicData uri="http://schemas.openxmlformats.org/drawingml/2006/table">
+            <a:tbl>
+              <a:tblPr firstRow="1" bandRow="1">
+                <a:tableStyleId>{5C22544A-7EE6-4342-B048-85BDC9FD1C3A}</a:tableStyleId>
+              </a:tblPr>
+              <a:tblGrid>
+                <a:gridCol w="2032000">
+                  <a:extLst>
+                    <a:ext uri="{9D8B030D-6E8A-4147-A177-3AD203B41FA5}">
+                      <a16:colId xmlns:a16="http://schemas.microsoft.com/office/drawing/2014/main" val="3894842504"/>
+                    </a:ext>
+                  </a:extLst>
+                </a:gridCol>
+                <a:gridCol w="2032000">
+                  <a:extLst>
+                    <a:ext uri="{9D8B030D-6E8A-4147-A177-3AD203B41FA5}">
+                      <a16:colId xmlns:a16="http://schemas.microsoft.com/office/drawing/2014/main" val="961461861"/>
+                    </a:ext>
+                  </a:extLst>
+                </a:gridCol>
+                <a:gridCol w="2032000">
+                  <a:extLst>
+                    <a:ext uri="{9D8B030D-6E8A-4147-A177-3AD203B41FA5}">
+                      <a16:colId xmlns:a16="http://schemas.microsoft.com/office/drawing/2014/main" val="779492511"/>
+                    </a:ext>
+                  </a:extLst>
+                </a:gridCol>
+                <a:gridCol w="2032000">
+                  <a:extLst>
+                    <a:ext uri="{9D8B030D-6E8A-4147-A177-3AD203B41FA5}">
+                      <a16:colId xmlns:a16="http://schemas.microsoft.com/office/drawing/2014/main" val="1893478059"/>
+                    </a:ext>
+                  </a:extLst>
+                </a:gridCol>
+              </a:tblGrid>
+              <a:tr h="370840">
+                <a:tc>
+                  <a:txBody>
+                    <a:bodyPr/>
+                    <a:lstStyle/>
+                    <a:p>
+                      <a:r>
+                        <a:rPr lang="en-AU" dirty="0"/>
+                        <a:t>Roles</a:t>
+                      </a:r>
+                    </a:p>
+                  </a:txBody>
+                  <a:tcPr/>
+                </a:tc>
+                <a:tc>
+                  <a:txBody>
+                    <a:bodyPr/>
+                    <a:lstStyle/>
+                    <a:p>
+                      <a:r>
+                        <a:rPr lang="en-AU" dirty="0"/>
+                        <a:t>Primary</a:t>
+                      </a:r>
+                    </a:p>
+                  </a:txBody>
+                  <a:tcPr/>
+                </a:tc>
+                <a:tc>
+                  <a:txBody>
+                    <a:bodyPr/>
+                    <a:lstStyle/>
+                    <a:p>
+                      <a:r>
+                        <a:rPr lang="en-AU" dirty="0"/>
+                        <a:t>Secondary</a:t>
+                      </a:r>
+                    </a:p>
+                  </a:txBody>
+                  <a:tcPr/>
+                </a:tc>
+                <a:tc>
+                  <a:txBody>
+                    <a:bodyPr/>
+                    <a:lstStyle/>
+                    <a:p>
+                      <a:r>
+                        <a:rPr lang="en-AU" dirty="0"/>
+                        <a:t>Support</a:t>
+                      </a:r>
+                    </a:p>
+                  </a:txBody>
+                  <a:tcPr/>
+                </a:tc>
+                <a:extLst>
+                  <a:ext uri="{0D108BD9-81ED-4DB2-BD59-A6C34878D82A}">
+                    <a16:rowId xmlns:a16="http://schemas.microsoft.com/office/drawing/2014/main" val="1583112351"/>
+                  </a:ext>
+                </a:extLst>
+              </a:tr>
+              <a:tr h="370840">
+                <a:tc>
+                  <a:txBody>
+                    <a:bodyPr/>
+                    <a:lstStyle/>
+                    <a:p>
+                      <a:r>
+                        <a:rPr lang="en-AU" dirty="0"/>
+                        <a:t>Serial module</a:t>
+                      </a:r>
+                    </a:p>
+                  </a:txBody>
+                  <a:tcPr/>
+                </a:tc>
+                <a:tc>
+                  <a:txBody>
+                    <a:bodyPr/>
+                    <a:lstStyle/>
+                    <a:p>
+                      <a:r>
+                        <a:rPr lang="en-AU" dirty="0"/>
+                        <a:t>Will</a:t>
+                      </a:r>
+                    </a:p>
+                  </a:txBody>
+                  <a:tcPr/>
+                </a:tc>
+                <a:tc>
+                  <a:txBody>
+                    <a:bodyPr/>
+                    <a:lstStyle/>
+                    <a:p>
+                      <a:r>
+                        <a:rPr lang="en-AU" dirty="0"/>
+                        <a:t>Joon</a:t>
+                      </a:r>
+                    </a:p>
+                  </a:txBody>
+                  <a:tcPr/>
+                </a:tc>
+                <a:tc>
+                  <a:txBody>
+                    <a:bodyPr/>
+                    <a:lstStyle/>
+                    <a:p>
+                      <a:endParaRPr lang="en-AU"/>
+                    </a:p>
+                  </a:txBody>
+                  <a:tcPr/>
+                </a:tc>
+                <a:extLst>
+                  <a:ext uri="{0D108BD9-81ED-4DB2-BD59-A6C34878D82A}">
+                    <a16:rowId xmlns:a16="http://schemas.microsoft.com/office/drawing/2014/main" val="2116312314"/>
+                  </a:ext>
+                </a:extLst>
+              </a:tr>
+              <a:tr h="370840">
+                <a:tc>
+                  <a:txBody>
+                    <a:bodyPr/>
+                    <a:lstStyle/>
+                    <a:p>
+                      <a:r>
+                        <a:rPr lang="en-AU" dirty="0"/>
+                        <a:t>Audio/visual module</a:t>
+                      </a:r>
+                    </a:p>
+                  </a:txBody>
+                  <a:tcPr/>
+                </a:tc>
+                <a:tc>
+                  <a:txBody>
+                    <a:bodyPr/>
+                    <a:lstStyle/>
+                    <a:p>
+                      <a:r>
+                        <a:rPr lang="en-AU" dirty="0"/>
+                        <a:t>Ethan</a:t>
+                      </a:r>
+                    </a:p>
+                  </a:txBody>
+                  <a:tcPr/>
+                </a:tc>
+                <a:tc>
+                  <a:txBody>
+                    <a:bodyPr/>
+                    <a:lstStyle/>
+                    <a:p>
+                      <a:endParaRPr lang="en-AU" dirty="0"/>
+                    </a:p>
+                  </a:txBody>
+                  <a:tcPr/>
+                </a:tc>
+                <a:tc>
+                  <a:txBody>
+                    <a:bodyPr/>
+                    <a:lstStyle/>
+                    <a:p>
+                      <a:endParaRPr lang="en-AU"/>
+                    </a:p>
+                  </a:txBody>
+                  <a:tcPr/>
+                </a:tc>
+                <a:extLst>
+                  <a:ext uri="{0D108BD9-81ED-4DB2-BD59-A6C34878D82A}">
+                    <a16:rowId xmlns:a16="http://schemas.microsoft.com/office/drawing/2014/main" val="3773811662"/>
+                  </a:ext>
+                </a:extLst>
+              </a:tr>
+              <a:tr h="370840">
+                <a:tc>
+                  <a:txBody>
+                    <a:bodyPr/>
+                    <a:lstStyle/>
+                    <a:p>
+                      <a:r>
+                        <a:rPr lang="en-AU" dirty="0"/>
+                        <a:t>Status module </a:t>
+                      </a:r>
+                    </a:p>
+                  </a:txBody>
+                  <a:tcPr/>
+                </a:tc>
+                <a:tc>
+                  <a:txBody>
+                    <a:bodyPr/>
+                    <a:lstStyle/>
+                    <a:p>
+                      <a:r>
+                        <a:rPr lang="en-AU" dirty="0"/>
+                        <a:t>Joon</a:t>
+                      </a:r>
+                    </a:p>
+                  </a:txBody>
+                  <a:tcPr/>
+                </a:tc>
+                <a:tc>
+                  <a:txBody>
+                    <a:bodyPr/>
+                    <a:lstStyle/>
+                    <a:p>
+                      <a:endParaRPr lang="en-AU"/>
+                    </a:p>
+                  </a:txBody>
+                  <a:tcPr/>
+                </a:tc>
+                <a:tc>
+                  <a:txBody>
+                    <a:bodyPr/>
+                    <a:lstStyle/>
+                    <a:p>
+                      <a:endParaRPr lang="en-AU"/>
+                    </a:p>
+                  </a:txBody>
+                  <a:tcPr/>
+                </a:tc>
+                <a:extLst>
+                  <a:ext uri="{0D108BD9-81ED-4DB2-BD59-A6C34878D82A}">
+                    <a16:rowId xmlns:a16="http://schemas.microsoft.com/office/drawing/2014/main" val="2315356098"/>
+                  </a:ext>
+                </a:extLst>
+              </a:tr>
+              <a:tr h="370840">
+                <a:tc>
+                  <a:txBody>
+                    <a:bodyPr/>
+                    <a:lstStyle/>
+                    <a:p>
+                      <a:r>
+                        <a:rPr lang="en-AU"/>
+                        <a:t>Object tracking </a:t>
+                      </a:r>
+                      <a:r>
+                        <a:rPr lang="en-AU" dirty="0"/>
+                        <a:t>module</a:t>
+                      </a:r>
+                    </a:p>
+                  </a:txBody>
+                  <a:tcPr/>
+                </a:tc>
+                <a:tc>
+                  <a:txBody>
+                    <a:bodyPr/>
+                    <a:lstStyle/>
+                    <a:p>
+                      <a:r>
+                        <a:rPr lang="en-AU" dirty="0"/>
+                        <a:t>Taj</a:t>
+                      </a:r>
+                    </a:p>
+                  </a:txBody>
+                  <a:tcPr/>
+                </a:tc>
+                <a:tc>
+                  <a:txBody>
+                    <a:bodyPr/>
+                    <a:lstStyle/>
+                    <a:p>
+                      <a:r>
+                        <a:rPr lang="en-AU" dirty="0"/>
+                        <a:t>Josh</a:t>
+                      </a:r>
+                    </a:p>
+                  </a:txBody>
+                  <a:tcPr/>
+                </a:tc>
+                <a:tc>
+                  <a:txBody>
+                    <a:bodyPr/>
+                    <a:lstStyle/>
+                    <a:p>
+                      <a:endParaRPr lang="en-AU"/>
+                    </a:p>
+                  </a:txBody>
+                  <a:tcPr/>
+                </a:tc>
+                <a:extLst>
+                  <a:ext uri="{0D108BD9-81ED-4DB2-BD59-A6C34878D82A}">
+                    <a16:rowId xmlns:a16="http://schemas.microsoft.com/office/drawing/2014/main" val="3415284574"/>
+                  </a:ext>
+                </a:extLst>
+              </a:tr>
+              <a:tr h="370840">
+                <a:tc>
+                  <a:txBody>
+                    <a:bodyPr/>
+                    <a:lstStyle/>
+                    <a:p>
+                      <a:r>
+                        <a:rPr lang="en-AU" dirty="0"/>
+                        <a:t>Control module</a:t>
+                      </a:r>
+                    </a:p>
+                  </a:txBody>
+                  <a:tcPr/>
+                </a:tc>
+                <a:tc>
+                  <a:txBody>
+                    <a:bodyPr/>
+                    <a:lstStyle/>
+                    <a:p>
+                      <a:r>
+                        <a:rPr lang="en-AU" dirty="0"/>
+                        <a:t>Josh</a:t>
+                      </a:r>
+                    </a:p>
+                  </a:txBody>
+                  <a:tcPr/>
+                </a:tc>
+                <a:tc>
+                  <a:txBody>
+                    <a:bodyPr/>
+                    <a:lstStyle/>
+                    <a:p>
+                      <a:endParaRPr lang="en-AU" dirty="0"/>
+                    </a:p>
+                  </a:txBody>
+                  <a:tcPr/>
+                </a:tc>
+                <a:tc>
+                  <a:txBody>
+                    <a:bodyPr/>
+                    <a:lstStyle/>
+                    <a:p>
+                      <a:endParaRPr lang="en-AU"/>
+                    </a:p>
+                  </a:txBody>
+                  <a:tcPr/>
+                </a:tc>
+                <a:extLst>
+                  <a:ext uri="{0D108BD9-81ED-4DB2-BD59-A6C34878D82A}">
+                    <a16:rowId xmlns:a16="http://schemas.microsoft.com/office/drawing/2014/main" val="982157175"/>
+                  </a:ext>
+                </a:extLst>
+              </a:tr>
+              <a:tr h="370840">
+                <a:tc>
+                  <a:txBody>
+                    <a:bodyPr/>
+                    <a:lstStyle/>
+                    <a:p>
+                      <a:r>
+                        <a:rPr lang="en-AU" dirty="0"/>
+                        <a:t>Documentation</a:t>
+                      </a:r>
+                    </a:p>
+                  </a:txBody>
+                  <a:tcPr/>
+                </a:tc>
+                <a:tc>
+                  <a:txBody>
+                    <a:bodyPr/>
+                    <a:lstStyle/>
+                    <a:p>
+                      <a:r>
+                        <a:rPr lang="en-AU" dirty="0"/>
+                        <a:t>Will</a:t>
+                      </a:r>
+                    </a:p>
+                  </a:txBody>
+                  <a:tcPr/>
+                </a:tc>
+                <a:tc>
+                  <a:txBody>
+                    <a:bodyPr/>
+                    <a:lstStyle/>
+                    <a:p>
+                      <a:r>
+                        <a:rPr lang="en-AU" dirty="0"/>
+                        <a:t>Ethan</a:t>
+                      </a:r>
+                    </a:p>
+                  </a:txBody>
+                  <a:tcPr/>
+                </a:tc>
+                <a:tc>
+                  <a:txBody>
+                    <a:bodyPr/>
+                    <a:lstStyle/>
+                    <a:p>
+                      <a:endParaRPr lang="en-AU" dirty="0"/>
+                    </a:p>
+                  </a:txBody>
+                  <a:tcPr/>
+                </a:tc>
+                <a:extLst>
+                  <a:ext uri="{0D108BD9-81ED-4DB2-BD59-A6C34878D82A}">
+                    <a16:rowId xmlns:a16="http://schemas.microsoft.com/office/drawing/2014/main" val="3342758123"/>
+                  </a:ext>
+                </a:extLst>
+              </a:tr>
+            </a:tbl>
+          </a:graphicData>
+        </a:graphic>
+      </p:graphicFrame>
     </p:spTree>
     <p:extLst>
       <p:ext uri="{BB962C8B-B14F-4D97-AF65-F5344CB8AC3E}">
-        <p14:creationId xmlns:p14="http://schemas.microsoft.com/office/powerpoint/2010/main" val="1388907516"/>
+        <p14:creationId xmlns:p14="http://schemas.microsoft.com/office/powerpoint/2010/main" val="3060279616"/>
       </p:ext>
     </p:extLst>
   </p:cSld>
@@ -5238,7 +5627,7 @@
           <p:cNvPr id="2" name="Title 1">
             <a:extLst>
               <a:ext uri="{FF2B5EF4-FFF2-40B4-BE49-F238E27FC236}">
-                <a16:creationId xmlns:a16="http://schemas.microsoft.com/office/drawing/2014/main" id="{61186553-5FD4-CD22-6985-7147A59F9846}"/>
+                <a16:creationId xmlns:a16="http://schemas.microsoft.com/office/drawing/2014/main" id="{74FFB04B-03C3-FC82-7270-42C9D581FDAB}"/>
               </a:ext>
             </a:extLst>
           </p:cNvPr>
@@ -5256,11 +5645,11 @@
           <a:p>
             <a:r>
               <a:rPr lang="en-AU" dirty="0"/>
-              <a:t>AUDIO/Visual Module </a:t>
+              <a:t>Serial Module </a:t>
             </a:r>
             <a:r>
               <a:rPr lang="en-AU" dirty="0" err="1"/>
-              <a:t>PseudoCode</a:t>
+              <a:t>PSEUdoCode</a:t>
             </a:r>
             <a:endParaRPr lang="en-AU" dirty="0"/>
           </a:p>
@@ -5271,7 +5660,7 @@
           <p:cNvPr id="3" name="Content Placeholder 2">
             <a:extLst>
               <a:ext uri="{FF2B5EF4-FFF2-40B4-BE49-F238E27FC236}">
-                <a16:creationId xmlns:a16="http://schemas.microsoft.com/office/drawing/2014/main" id="{D6E3B58C-8F2D-149C-F3F6-FBCDD2243EFC}"/>
+                <a16:creationId xmlns:a16="http://schemas.microsoft.com/office/drawing/2014/main" id="{0EBF9320-EB38-2A17-003E-330D32C5491B}"/>
               </a:ext>
             </a:extLst>
           </p:cNvPr>
@@ -5285,7 +5674,7 @@
         <p:spPr/>
         <p:txBody>
           <a:bodyPr>
-            <a:normAutofit fontScale="77500" lnSpcReduction="20000"/>
+            <a:normAutofit lnSpcReduction="10000"/>
           </a:bodyPr>
           <a:lstStyle/>
           <a:p>
@@ -5293,85 +5682,71 @@
               <a:buNone/>
             </a:pPr>
             <a:r>
-              <a:rPr lang="en-AU" b="1" dirty="0"/>
-              <a:t>Sound Module </a:t>
-            </a:r>
-          </a:p>
-          <a:p>
-            <a:r>
-              <a:rPr lang="en-GB" dirty="0"/>
-              <a:t>Take in distance b/w cart and user (maybe via function call)</a:t>
-            </a:r>
-          </a:p>
-          <a:p>
-            <a:r>
-              <a:rPr lang="en-GB" dirty="0"/>
-              <a:t>If user is too close beep</a:t>
-            </a:r>
-          </a:p>
-          <a:p>
-            <a:pPr lvl="1"/>
-            <a:r>
-              <a:rPr lang="en-GB" dirty="0"/>
-              <a:t>Beep at variable lengths based on distance</a:t>
-            </a:r>
-          </a:p>
-          <a:p>
-            <a:pPr lvl="1"/>
-            <a:endParaRPr lang="en-GB" dirty="0"/>
+              <a:rPr lang="en-GB" sz="1400" b="1" dirty="0"/>
+              <a:t>Serial Output</a:t>
+            </a:r>
+          </a:p>
+          <a:p>
+            <a:r>
+              <a:rPr lang="en-GB" sz="1400" dirty="0"/>
+              <a:t>Function called</a:t>
+            </a:r>
+          </a:p>
+          <a:p>
+            <a:r>
+              <a:rPr lang="en-GB" sz="1400" dirty="0"/>
+              <a:t>Load argument into buffer and end buffer with null</a:t>
+            </a:r>
+          </a:p>
+          <a:p>
+            <a:r>
+              <a:rPr lang="en-GB" sz="1400" dirty="0"/>
+              <a:t>Update message to send bit/register to true</a:t>
+            </a:r>
+          </a:p>
+          <a:p>
+            <a:r>
+              <a:rPr lang="en-GB" sz="1400" dirty="0"/>
+              <a:t>Check whether terminal ready to receive</a:t>
+            </a:r>
+          </a:p>
+          <a:p>
+            <a:r>
+              <a:rPr lang="en-GB" sz="1400" dirty="0"/>
+              <a:t>If ready to receive, transmit character by character until null reached Update message to send bit/register to false</a:t>
+            </a:r>
+          </a:p>
+          <a:p>
+            <a:r>
+              <a:rPr lang="en-GB" sz="1400" dirty="0"/>
+              <a:t>Clear buffer </a:t>
+            </a:r>
           </a:p>
           <a:p>
             <a:pPr marL="0" indent="0">
               <a:buNone/>
             </a:pPr>
             <a:r>
-              <a:rPr lang="en-GB" b="1" dirty="0"/>
-              <a:t>Visual Module</a:t>
-            </a:r>
-          </a:p>
-          <a:p>
-            <a:r>
-              <a:rPr lang="en-GB" dirty="0"/>
-              <a:t>Take in distance b/w cart and user (maybe via function call)</a:t>
-            </a:r>
-          </a:p>
-          <a:p>
-            <a:r>
-              <a:rPr lang="en-GB" dirty="0"/>
-              <a:t>Convert integer values to array of digits example:</a:t>
-            </a:r>
-          </a:p>
-          <a:p>
-            <a:pPr lvl="1"/>
-            <a:r>
-              <a:rPr lang="en-GB" dirty="0"/>
-              <a:t>(assumed max distance = 40m, therefore max digits = 2)</a:t>
-            </a:r>
-          </a:p>
-          <a:p>
-            <a:pPr lvl="1"/>
-            <a:r>
-              <a:rPr lang="en-GB" dirty="0"/>
-              <a:t>Distance = 2, array = [0, 2], displayed “02”</a:t>
-            </a:r>
-          </a:p>
-          <a:p>
-            <a:pPr lvl="1"/>
-            <a:r>
-              <a:rPr lang="en-GB" dirty="0"/>
-              <a:t>Distance = 13, array = [1,3], displayed “13”</a:t>
-            </a:r>
-          </a:p>
-          <a:p>
-            <a:r>
-              <a:rPr lang="en-GB" dirty="0"/>
-              <a:t>Convert to seven seg values </a:t>
-            </a:r>
-          </a:p>
-          <a:p>
-            <a:r>
-              <a:rPr lang="en-GB" dirty="0"/>
-              <a:t>Send to 7-seg display </a:t>
+              <a:rPr lang="en-GB" sz="1400" b="1" dirty="0"/>
+              <a:t>Serial Input</a:t>
+            </a:r>
+          </a:p>
+          <a:p>
+            <a:r>
+              <a:rPr lang="en-GB" sz="1400" dirty="0"/>
+              <a:t>If receive interrupt triggered </a:t>
+            </a:r>
+          </a:p>
+          <a:p>
+            <a:r>
+              <a:rPr lang="en-GB" sz="1400" dirty="0"/>
+              <a:t>While message waiting to be received, read character by character into buffer</a:t>
+            </a:r>
+          </a:p>
+          <a:p>
+            <a:r>
+              <a:rPr lang="en-GB" sz="1400" dirty="0"/>
+              <a:t>Update message to receive bit/register to false once null character received</a:t>
             </a:r>
           </a:p>
           <a:p>
@@ -5382,7 +5757,7 @@
     </p:spTree>
     <p:extLst>
       <p:ext uri="{BB962C8B-B14F-4D97-AF65-F5344CB8AC3E}">
-        <p14:creationId xmlns:p14="http://schemas.microsoft.com/office/powerpoint/2010/main" val="2688705024"/>
+        <p14:creationId xmlns:p14="http://schemas.microsoft.com/office/powerpoint/2010/main" val="1388907516"/>
       </p:ext>
     </p:extLst>
   </p:cSld>
@@ -5414,7 +5789,7 @@
           <p:cNvPr id="2" name="Title 1">
             <a:extLst>
               <a:ext uri="{FF2B5EF4-FFF2-40B4-BE49-F238E27FC236}">
-                <a16:creationId xmlns:a16="http://schemas.microsoft.com/office/drawing/2014/main" id="{9A3D1D8F-4F5C-B9C7-818A-6403B04EB8CD}"/>
+                <a16:creationId xmlns:a16="http://schemas.microsoft.com/office/drawing/2014/main" id="{61186553-5FD4-CD22-6985-7147A59F9846}"/>
               </a:ext>
             </a:extLst>
           </p:cNvPr>
@@ -5432,7 +5807,7 @@
           <a:p>
             <a:r>
               <a:rPr lang="en-AU" dirty="0"/>
-              <a:t>Status Module </a:t>
+              <a:t>AUDIO/Visual Module </a:t>
             </a:r>
             <a:r>
               <a:rPr lang="en-AU" dirty="0" err="1"/>
@@ -5447,7 +5822,7 @@
           <p:cNvPr id="3" name="Content Placeholder 2">
             <a:extLst>
               <a:ext uri="{FF2B5EF4-FFF2-40B4-BE49-F238E27FC236}">
-                <a16:creationId xmlns:a16="http://schemas.microsoft.com/office/drawing/2014/main" id="{3C51674D-F2C9-863E-DA90-C0BA1DF65793}"/>
+                <a16:creationId xmlns:a16="http://schemas.microsoft.com/office/drawing/2014/main" id="{D6E3B58C-8F2D-149C-F3F6-FBCDD2243EFC}"/>
               </a:ext>
             </a:extLst>
           </p:cNvPr>
@@ -5460,17 +5835,105 @@
         </p:nvSpPr>
         <p:spPr/>
         <p:txBody>
-          <a:bodyPr/>
+          <a:bodyPr>
+            <a:normAutofit fontScale="77500" lnSpcReduction="20000"/>
+          </a:bodyPr>
           <a:lstStyle/>
           <a:p>
-            <a:endParaRPr lang="en-AU"/>
+            <a:pPr marL="0" indent="0">
+              <a:buNone/>
+            </a:pPr>
+            <a:r>
+              <a:rPr lang="en-AU" b="1" dirty="0"/>
+              <a:t>Sound Module </a:t>
+            </a:r>
+          </a:p>
+          <a:p>
+            <a:r>
+              <a:rPr lang="en-GB" dirty="0"/>
+              <a:t>Take in distance b/w cart and user (maybe via function call)</a:t>
+            </a:r>
+          </a:p>
+          <a:p>
+            <a:r>
+              <a:rPr lang="en-GB" dirty="0"/>
+              <a:t>If user is too close beep</a:t>
+            </a:r>
+          </a:p>
+          <a:p>
+            <a:pPr lvl="1"/>
+            <a:r>
+              <a:rPr lang="en-GB" dirty="0"/>
+              <a:t>Beep at variable lengths based on distance</a:t>
+            </a:r>
+          </a:p>
+          <a:p>
+            <a:pPr lvl="1"/>
+            <a:endParaRPr lang="en-GB" dirty="0"/>
+          </a:p>
+          <a:p>
+            <a:pPr marL="0" indent="0">
+              <a:buNone/>
+            </a:pPr>
+            <a:r>
+              <a:rPr lang="en-GB" b="1" dirty="0"/>
+              <a:t>Visual Module</a:t>
+            </a:r>
+          </a:p>
+          <a:p>
+            <a:r>
+              <a:rPr lang="en-GB" dirty="0"/>
+              <a:t>Take in distance b/w cart and user (maybe via function call)</a:t>
+            </a:r>
+          </a:p>
+          <a:p>
+            <a:r>
+              <a:rPr lang="en-GB" dirty="0"/>
+              <a:t>Convert integer values to array of digits example:</a:t>
+            </a:r>
+          </a:p>
+          <a:p>
+            <a:pPr lvl="1"/>
+            <a:r>
+              <a:rPr lang="en-GB" dirty="0"/>
+              <a:t>(assumed max distance = 40m, therefore max digits = 2)</a:t>
+            </a:r>
+          </a:p>
+          <a:p>
+            <a:pPr lvl="1"/>
+            <a:r>
+              <a:rPr lang="en-GB" dirty="0"/>
+              <a:t>Distance = 2, array = [0, 2], displayed “02”</a:t>
+            </a:r>
+          </a:p>
+          <a:p>
+            <a:pPr lvl="1"/>
+            <a:r>
+              <a:rPr lang="en-GB" dirty="0"/>
+              <a:t>Distance = 13, array = [1,3], displayed “13”</a:t>
+            </a:r>
+          </a:p>
+          <a:p>
+            <a:r>
+              <a:rPr lang="en-GB" dirty="0"/>
+              <a:t>Convert to seven seg values </a:t>
+            </a:r>
+          </a:p>
+          <a:p>
+            <a:r>
+              <a:rPr lang="en-GB" dirty="0"/>
+              <a:t>Send to 7-seg display </a:t>
+            </a:r>
+          </a:p>
+          <a:p>
+            <a:endParaRPr lang="en-AU" dirty="0"/>
           </a:p>
         </p:txBody>
       </p:sp>
     </p:spTree>
     <p:extLst>
       <p:ext uri="{BB962C8B-B14F-4D97-AF65-F5344CB8AC3E}">
-        <p14:creationId xmlns:p14="http://schemas.microsoft.com/office/powerpoint/2010/main" val="1386790310"/>
+        <p14:creationId xmlns:p14="http://schemas.microsoft.com/office/powerpoint/2010/main" val="2688705024"/>
       </p:ext>
     </p:extLst>
   </p:cSld>
@@ -5502,7 +5965,7 @@
           <p:cNvPr id="2" name="Title 1">
             <a:extLst>
               <a:ext uri="{FF2B5EF4-FFF2-40B4-BE49-F238E27FC236}">
-                <a16:creationId xmlns:a16="http://schemas.microsoft.com/office/drawing/2014/main" id="{7D247151-C035-1403-E1AE-AB0F8CD6D39C}"/>
+                <a16:creationId xmlns:a16="http://schemas.microsoft.com/office/drawing/2014/main" id="{9A3D1D8F-4F5C-B9C7-818A-6403B04EB8CD}"/>
               </a:ext>
             </a:extLst>
           </p:cNvPr>
@@ -5520,11 +5983,11 @@
           <a:p>
             <a:r>
               <a:rPr lang="en-AU" dirty="0"/>
-              <a:t>Object Detection </a:t>
+              <a:t>Status Module </a:t>
             </a:r>
             <a:r>
               <a:rPr lang="en-AU" dirty="0" err="1"/>
-              <a:t>PseudoCOde</a:t>
+              <a:t>PseudoCode</a:t>
             </a:r>
             <a:endParaRPr lang="en-AU" dirty="0"/>
           </a:p>
@@ -5535,7 +5998,7 @@
           <p:cNvPr id="3" name="Content Placeholder 2">
             <a:extLst>
               <a:ext uri="{FF2B5EF4-FFF2-40B4-BE49-F238E27FC236}">
-                <a16:creationId xmlns:a16="http://schemas.microsoft.com/office/drawing/2014/main" id="{DEE44771-E1AB-8F1A-310E-874126DC889F}"/>
+                <a16:creationId xmlns:a16="http://schemas.microsoft.com/office/drawing/2014/main" id="{3C51674D-F2C9-863E-DA90-C0BA1DF65793}"/>
               </a:ext>
             </a:extLst>
           </p:cNvPr>
@@ -5548,17 +6011,104 @@
         </p:nvSpPr>
         <p:spPr/>
         <p:txBody>
-          <a:bodyPr/>
+          <a:bodyPr>
+            <a:normAutofit fontScale="70000" lnSpcReduction="20000"/>
+          </a:bodyPr>
           <a:lstStyle/>
           <a:p>
-            <a:endParaRPr lang="en-AU"/>
+            <a:pPr marL="0" indent="0">
+              <a:buNone/>
+            </a:pPr>
+            <a:r>
+              <a:rPr lang="en-GB" b="1" dirty="0"/>
+              <a:t>Calibrate</a:t>
+            </a:r>
+          </a:p>
+          <a:p>
+            <a:r>
+              <a:rPr lang="en-GB" dirty="0"/>
+              <a:t>Get current gyro readings</a:t>
+            </a:r>
+          </a:p>
+          <a:p>
+            <a:r>
+              <a:rPr lang="en-GB" dirty="0"/>
+              <a:t>Store readings in the gyro offset variable</a:t>
+            </a:r>
+          </a:p>
+          <a:p>
+            <a:r>
+              <a:rPr lang="en-GB" dirty="0"/>
+              <a:t>Get current accelerometer readings</a:t>
+            </a:r>
+          </a:p>
+          <a:p>
+            <a:r>
+              <a:rPr lang="en-GB" dirty="0"/>
+              <a:t>Calculate the magnitude and scale it to 9.81</a:t>
+            </a:r>
+          </a:p>
+          <a:p>
+            <a:r>
+              <a:rPr lang="en-GB" dirty="0"/>
+              <a:t>Store calculated value in the accel scale variable</a:t>
+            </a:r>
+          </a:p>
+          <a:p>
+            <a:pPr marL="0" indent="0">
+              <a:buNone/>
+            </a:pPr>
+            <a:r>
+              <a:rPr lang="en-GB" b="1" dirty="0"/>
+              <a:t>Get gyro/accel</a:t>
+            </a:r>
+          </a:p>
+          <a:p>
+            <a:r>
+              <a:rPr lang="en-GB" dirty="0"/>
+              <a:t>Get current raw readings</a:t>
+            </a:r>
+          </a:p>
+          <a:p>
+            <a:r>
+              <a:rPr lang="en-GB" dirty="0"/>
+              <a:t>Offset and scale gyro/accel readings with values calculated during calibration</a:t>
+            </a:r>
+          </a:p>
+          <a:p>
+            <a:r>
+              <a:rPr lang="en-GB" dirty="0"/>
+              <a:t>Return values</a:t>
+            </a:r>
+          </a:p>
+          <a:p>
+            <a:pPr marL="0" indent="0">
+              <a:buNone/>
+            </a:pPr>
+            <a:r>
+              <a:rPr lang="en-GB" b="1" dirty="0"/>
+              <a:t>Get tilt</a:t>
+            </a:r>
+          </a:p>
+          <a:p>
+            <a:r>
+              <a:rPr lang="en-GB" dirty="0"/>
+              <a:t>Get the y-component of the accelerometer and take inverse cosine to get angle</a:t>
+            </a:r>
+          </a:p>
+          <a:p>
+            <a:r>
+              <a:rPr lang="en-GB" dirty="0"/>
+              <a:t>If it is greater than 45° it is tipped over</a:t>
+            </a:r>
+            <a:endParaRPr lang="en-AU" dirty="0"/>
           </a:p>
         </p:txBody>
       </p:sp>
     </p:spTree>
     <p:extLst>
       <p:ext uri="{BB962C8B-B14F-4D97-AF65-F5344CB8AC3E}">
-        <p14:creationId xmlns:p14="http://schemas.microsoft.com/office/powerpoint/2010/main" val="4222870142"/>
+        <p14:creationId xmlns:p14="http://schemas.microsoft.com/office/powerpoint/2010/main" val="1386790310"/>
       </p:ext>
     </p:extLst>
   </p:cSld>
@@ -5590,7 +6140,7 @@
           <p:cNvPr id="2" name="Title 1">
             <a:extLst>
               <a:ext uri="{FF2B5EF4-FFF2-40B4-BE49-F238E27FC236}">
-                <a16:creationId xmlns:a16="http://schemas.microsoft.com/office/drawing/2014/main" id="{62201C1F-E907-1BCC-861D-AB4AE8A70835}"/>
+                <a16:creationId xmlns:a16="http://schemas.microsoft.com/office/drawing/2014/main" id="{7D247151-C035-1403-E1AE-AB0F8CD6D39C}"/>
               </a:ext>
             </a:extLst>
           </p:cNvPr>
@@ -5608,11 +6158,11 @@
           <a:p>
             <a:r>
               <a:rPr lang="en-AU" dirty="0"/>
-              <a:t>Object Tracking </a:t>
+              <a:t>Object Detection </a:t>
             </a:r>
             <a:r>
               <a:rPr lang="en-AU" dirty="0" err="1"/>
-              <a:t>PseudoCode</a:t>
+              <a:t>PseudoCOde</a:t>
             </a:r>
             <a:endParaRPr lang="en-AU" dirty="0"/>
           </a:p>
@@ -5623,7 +6173,7 @@
           <p:cNvPr id="3" name="Content Placeholder 2">
             <a:extLst>
               <a:ext uri="{FF2B5EF4-FFF2-40B4-BE49-F238E27FC236}">
-                <a16:creationId xmlns:a16="http://schemas.microsoft.com/office/drawing/2014/main" id="{83069135-8FFE-68D9-A5E2-FCC4EEA08ADC}"/>
+                <a16:creationId xmlns:a16="http://schemas.microsoft.com/office/drawing/2014/main" id="{DEE44771-E1AB-8F1A-310E-874126DC889F}"/>
               </a:ext>
             </a:extLst>
           </p:cNvPr>
@@ -5646,7 +6196,7 @@
     </p:spTree>
     <p:extLst>
       <p:ext uri="{BB962C8B-B14F-4D97-AF65-F5344CB8AC3E}">
-        <p14:creationId xmlns:p14="http://schemas.microsoft.com/office/powerpoint/2010/main" val="3401488611"/>
+        <p14:creationId xmlns:p14="http://schemas.microsoft.com/office/powerpoint/2010/main" val="4222870142"/>
       </p:ext>
     </p:extLst>
   </p:cSld>
@@ -5678,7 +6228,7 @@
           <p:cNvPr id="2" name="Title 1">
             <a:extLst>
               <a:ext uri="{FF2B5EF4-FFF2-40B4-BE49-F238E27FC236}">
-                <a16:creationId xmlns:a16="http://schemas.microsoft.com/office/drawing/2014/main" id="{48757BBC-89D7-EE7D-3C66-24D77201413A}"/>
+                <a16:creationId xmlns:a16="http://schemas.microsoft.com/office/drawing/2014/main" id="{62201C1F-E907-1BCC-861D-AB4AE8A70835}"/>
               </a:ext>
             </a:extLst>
           </p:cNvPr>
@@ -5689,29 +6239,29 @@
             <p:ph type="title"/>
           </p:nvPr>
         </p:nvSpPr>
-        <p:spPr>
-          <a:xfrm>
-            <a:off x="578438" y="5200285"/>
-            <a:ext cx="11029616" cy="566738"/>
-          </a:xfrm>
-        </p:spPr>
+        <p:spPr/>
         <p:txBody>
           <a:bodyPr/>
           <a:lstStyle/>
           <a:p>
             <a:r>
               <a:rPr lang="en-AU" dirty="0"/>
-              <a:t>Technology Demonstration</a:t>
-            </a:r>
-          </a:p>
-        </p:txBody>
-      </p:sp>
-      <p:sp>
-        <p:nvSpPr>
-          <p:cNvPr id="3" name="Picture Placeholder 2">
+              <a:t>CONTROL </a:t>
+            </a:r>
+            <a:r>
+              <a:rPr lang="en-AU" dirty="0" err="1"/>
+              <a:t>PseudoCode</a:t>
+            </a:r>
+            <a:endParaRPr lang="en-AU" dirty="0"/>
+          </a:p>
+        </p:txBody>
+      </p:sp>
+      <p:sp>
+        <p:nvSpPr>
+          <p:cNvPr id="3" name="Content Placeholder 2">
             <a:extLst>
               <a:ext uri="{FF2B5EF4-FFF2-40B4-BE49-F238E27FC236}">
-                <a16:creationId xmlns:a16="http://schemas.microsoft.com/office/drawing/2014/main" id="{52030731-F1D3-702F-CC5F-376FD2EE4C17}"/>
+                <a16:creationId xmlns:a16="http://schemas.microsoft.com/office/drawing/2014/main" id="{83069135-8FFE-68D9-A5E2-FCC4EEA08ADC}"/>
               </a:ext>
             </a:extLst>
           </p:cNvPr>
@@ -5719,15 +6269,22 @@
             <a:spLocks noGrp="1"/>
           </p:cNvSpPr>
           <p:nvPr>
-            <p:ph type="pic" idx="1"/>
+            <p:ph idx="1"/>
           </p:nvPr>
         </p:nvSpPr>
         <p:spPr/>
+        <p:txBody>
+          <a:bodyPr/>
+          <a:lstStyle/>
+          <a:p>
+            <a:endParaRPr lang="en-AU"/>
+          </a:p>
+        </p:txBody>
       </p:sp>
     </p:spTree>
     <p:extLst>
       <p:ext uri="{BB962C8B-B14F-4D97-AF65-F5344CB8AC3E}">
-        <p14:creationId xmlns:p14="http://schemas.microsoft.com/office/powerpoint/2010/main" val="3376248172"/>
+        <p14:creationId xmlns:p14="http://schemas.microsoft.com/office/powerpoint/2010/main" val="3401488611"/>
       </p:ext>
     </p:extLst>
   </p:cSld>
@@ -5759,6 +6316,87 @@
           <p:cNvPr id="2" name="Title 1">
             <a:extLst>
               <a:ext uri="{FF2B5EF4-FFF2-40B4-BE49-F238E27FC236}">
+                <a16:creationId xmlns:a16="http://schemas.microsoft.com/office/drawing/2014/main" id="{48757BBC-89D7-EE7D-3C66-24D77201413A}"/>
+              </a:ext>
+            </a:extLst>
+          </p:cNvPr>
+          <p:cNvSpPr>
+            <a:spLocks noGrp="1"/>
+          </p:cNvSpPr>
+          <p:nvPr>
+            <p:ph type="title"/>
+          </p:nvPr>
+        </p:nvSpPr>
+        <p:spPr>
+          <a:xfrm>
+            <a:off x="578438" y="5200285"/>
+            <a:ext cx="11029616" cy="566738"/>
+          </a:xfrm>
+        </p:spPr>
+        <p:txBody>
+          <a:bodyPr/>
+          <a:lstStyle/>
+          <a:p>
+            <a:r>
+              <a:rPr lang="en-AU" dirty="0"/>
+              <a:t>Technology Demonstration</a:t>
+            </a:r>
+          </a:p>
+        </p:txBody>
+      </p:sp>
+      <p:sp>
+        <p:nvSpPr>
+          <p:cNvPr id="3" name="Picture Placeholder 2">
+            <a:extLst>
+              <a:ext uri="{FF2B5EF4-FFF2-40B4-BE49-F238E27FC236}">
+                <a16:creationId xmlns:a16="http://schemas.microsoft.com/office/drawing/2014/main" id="{52030731-F1D3-702F-CC5F-376FD2EE4C17}"/>
+              </a:ext>
+            </a:extLst>
+          </p:cNvPr>
+          <p:cNvSpPr>
+            <a:spLocks noGrp="1"/>
+          </p:cNvSpPr>
+          <p:nvPr>
+            <p:ph type="pic" idx="1"/>
+          </p:nvPr>
+        </p:nvSpPr>
+        <p:spPr/>
+      </p:sp>
+    </p:spTree>
+    <p:extLst>
+      <p:ext uri="{BB962C8B-B14F-4D97-AF65-F5344CB8AC3E}">
+        <p14:creationId xmlns:p14="http://schemas.microsoft.com/office/powerpoint/2010/main" val="3376248172"/>
+      </p:ext>
+    </p:extLst>
+  </p:cSld>
+  <p:clrMapOvr>
+    <a:masterClrMapping/>
+  </p:clrMapOvr>
+</p:sld>
+</file>
+
+<file path=ppt/slides/slide17.xml><?xml version="1.0" encoding="utf-8"?>
+<p:sld xmlns:a="http://schemas.openxmlformats.org/drawingml/2006/main" xmlns:r="http://schemas.openxmlformats.org/officeDocument/2006/relationships" xmlns:p="http://schemas.openxmlformats.org/presentationml/2006/main">
+  <p:cSld>
+    <p:spTree>
+      <p:nvGrpSpPr>
+        <p:cNvPr id="1" name=""/>
+        <p:cNvGrpSpPr/>
+        <p:nvPr/>
+      </p:nvGrpSpPr>
+      <p:grpSpPr>
+        <a:xfrm>
+          <a:off x="0" y="0"/>
+          <a:ext cx="0" cy="0"/>
+          <a:chOff x="0" y="0"/>
+          <a:chExt cx="0" cy="0"/>
+        </a:xfrm>
+      </p:grpSpPr>
+      <p:sp>
+        <p:nvSpPr>
+          <p:cNvPr id="2" name="Title 1">
+            <a:extLst>
+              <a:ext uri="{FF2B5EF4-FFF2-40B4-BE49-F238E27FC236}">
                 <a16:creationId xmlns:a16="http://schemas.microsoft.com/office/drawing/2014/main" id="{9F962E82-A7FC-0097-8405-5C08E8F5782B}"/>
               </a:ext>
             </a:extLst>
@@ -5803,7 +6441,37 @@
           <a:bodyPr/>
           <a:lstStyle/>
           <a:p>
-            <a:endParaRPr lang="en-AU" dirty="0"/>
+            <a:r>
+              <a:rPr lang="en-AU" dirty="0"/>
+              <a:t>Given a larger budget and expanded team, we hope to fully develop our system. </a:t>
+            </a:r>
+          </a:p>
+          <a:p>
+            <a:r>
+              <a:rPr lang="en-AU" dirty="0"/>
+              <a:t>Doing so would involve making the system mobile and operational at higher speeds. This will be achieved through:</a:t>
+            </a:r>
+          </a:p>
+          <a:p>
+            <a:pPr lvl="1"/>
+            <a:r>
+              <a:rPr lang="en-AU" dirty="0"/>
+              <a:t>Higher-quality components </a:t>
+            </a:r>
+          </a:p>
+          <a:p>
+            <a:pPr lvl="1"/>
+            <a:r>
+              <a:rPr lang="en-AU" dirty="0"/>
+              <a:t>Larger amounts of testing </a:t>
+            </a:r>
+          </a:p>
+          <a:p>
+            <a:pPr lvl="1"/>
+            <a:r>
+              <a:rPr lang="en-AU" dirty="0"/>
+              <a:t>More software development time </a:t>
+            </a:r>
           </a:p>
         </p:txBody>
       </p:sp>
@@ -5820,7 +6488,7 @@
 </p:sld>
 </file>
 
-<file path=ppt/slides/slide17.xml><?xml version="1.0" encoding="utf-8"?>
+<file path=ppt/slides/slide18.xml><?xml version="1.0" encoding="utf-8"?>
 <p:sld xmlns:a="http://schemas.openxmlformats.org/drawingml/2006/main" xmlns:r="http://schemas.openxmlformats.org/officeDocument/2006/relationships" xmlns:p="http://schemas.openxmlformats.org/presentationml/2006/main">
   <p:cSld>
     <p:bg>
@@ -6287,6 +6955,191 @@
 </p:sld>
 </file>
 
+<file path=ppt/slides/slide19.xml><?xml version="1.0" encoding="utf-8"?>
+<p:sld xmlns:a="http://schemas.openxmlformats.org/drawingml/2006/main" xmlns:r="http://schemas.openxmlformats.org/officeDocument/2006/relationships" xmlns:p="http://schemas.openxmlformats.org/presentationml/2006/main">
+  <p:cSld>
+    <p:spTree>
+      <p:nvGrpSpPr>
+        <p:cNvPr id="1" name=""/>
+        <p:cNvGrpSpPr/>
+        <p:nvPr/>
+      </p:nvGrpSpPr>
+      <p:grpSpPr>
+        <a:xfrm>
+          <a:off x="0" y="0"/>
+          <a:ext cx="0" cy="0"/>
+          <a:chOff x="0" y="0"/>
+          <a:chExt cx="0" cy="0"/>
+        </a:xfrm>
+      </p:grpSpPr>
+      <p:sp>
+        <p:nvSpPr>
+          <p:cNvPr id="2" name="Title 1">
+            <a:extLst>
+              <a:ext uri="{FF2B5EF4-FFF2-40B4-BE49-F238E27FC236}">
+                <a16:creationId xmlns:a16="http://schemas.microsoft.com/office/drawing/2014/main" id="{0A2EAE22-108C-C2A2-0938-80C401D40202}"/>
+              </a:ext>
+            </a:extLst>
+          </p:cNvPr>
+          <p:cNvSpPr>
+            <a:spLocks noGrp="1"/>
+          </p:cNvSpPr>
+          <p:nvPr>
+            <p:ph type="title"/>
+          </p:nvPr>
+        </p:nvSpPr>
+        <p:spPr/>
+        <p:txBody>
+          <a:bodyPr/>
+          <a:lstStyle/>
+          <a:p>
+            <a:r>
+              <a:rPr lang="en-AU" dirty="0"/>
+              <a:t>References</a:t>
+            </a:r>
+          </a:p>
+        </p:txBody>
+      </p:sp>
+      <p:sp>
+        <p:nvSpPr>
+          <p:cNvPr id="3" name="Content Placeholder 2">
+            <a:extLst>
+              <a:ext uri="{FF2B5EF4-FFF2-40B4-BE49-F238E27FC236}">
+                <a16:creationId xmlns:a16="http://schemas.microsoft.com/office/drawing/2014/main" id="{95AF37C4-9092-A984-28C2-94513C5E279C}"/>
+              </a:ext>
+            </a:extLst>
+          </p:cNvPr>
+          <p:cNvSpPr>
+            <a:spLocks noGrp="1"/>
+          </p:cNvSpPr>
+          <p:nvPr>
+            <p:ph idx="1"/>
+          </p:nvPr>
+        </p:nvSpPr>
+        <p:spPr/>
+        <p:txBody>
+          <a:bodyPr/>
+          <a:lstStyle/>
+          <a:p>
+            <a:pPr marL="342900" indent="-342900">
+              <a:buFont typeface="+mj-lt"/>
+              <a:buAutoNum type="arabicPeriod"/>
+            </a:pPr>
+            <a:r>
+              <a:rPr lang="en-US" sz="1800" dirty="0">
+                <a:solidFill>
+                  <a:srgbClr val="595959"/>
+                </a:solidFill>
+                <a:effectLst/>
+                <a:latin typeface="Constantia" panose="02030602050306030303" pitchFamily="18" charset="0"/>
+                <a:ea typeface="Constantia" panose="02030602050306030303" pitchFamily="18" charset="0"/>
+                <a:cs typeface="Browallia New" panose="020B0604020202020204" pitchFamily="34" charset="-34"/>
+              </a:rPr>
+              <a:t>Chan woo, P., Chan Young, C., &amp; </a:t>
+            </a:r>
+            <a:r>
+              <a:rPr lang="en-US" sz="1800" dirty="0" err="1">
+                <a:solidFill>
+                  <a:srgbClr val="595959"/>
+                </a:solidFill>
+                <a:effectLst/>
+                <a:latin typeface="Constantia" panose="02030602050306030303" pitchFamily="18" charset="0"/>
+                <a:ea typeface="Constantia" panose="02030602050306030303" pitchFamily="18" charset="0"/>
+                <a:cs typeface="Browallia New" panose="020B0604020202020204" pitchFamily="34" charset="-34"/>
+              </a:rPr>
+              <a:t>Eun</a:t>
+            </a:r>
+            <a:r>
+              <a:rPr lang="en-US" sz="1800" dirty="0">
+                <a:solidFill>
+                  <a:srgbClr val="595959"/>
+                </a:solidFill>
+                <a:effectLst/>
+                <a:latin typeface="Constantia" panose="02030602050306030303" pitchFamily="18" charset="0"/>
+                <a:ea typeface="Constantia" panose="02030602050306030303" pitchFamily="18" charset="0"/>
+                <a:cs typeface="Browallia New" panose="020B0604020202020204" pitchFamily="34" charset="-34"/>
+              </a:rPr>
+              <a:t> ji, L. (2019, June 2). </a:t>
+            </a:r>
+            <a:r>
+              <a:rPr lang="en-US" sz="1800" i="1" dirty="0">
+                <a:solidFill>
+                  <a:srgbClr val="595959"/>
+                </a:solidFill>
+                <a:effectLst/>
+                <a:latin typeface="Constantia" panose="02030602050306030303" pitchFamily="18" charset="0"/>
+                <a:ea typeface="Constantia" panose="02030602050306030303" pitchFamily="18" charset="0"/>
+                <a:cs typeface="Browallia New" panose="020B0604020202020204" pitchFamily="34" charset="-34"/>
+              </a:rPr>
+              <a:t>MOBI</a:t>
+            </a:r>
+            <a:r>
+              <a:rPr lang="en-US" sz="1800" dirty="0">
+                <a:solidFill>
+                  <a:srgbClr val="595959"/>
+                </a:solidFill>
+                <a:effectLst/>
+                <a:latin typeface="Constantia" panose="02030602050306030303" pitchFamily="18" charset="0"/>
+                <a:ea typeface="Constantia" panose="02030602050306030303" pitchFamily="18" charset="0"/>
+                <a:cs typeface="Browallia New" panose="020B0604020202020204" pitchFamily="34" charset="-34"/>
+              </a:rPr>
+              <a:t>. Retrieved from </a:t>
+            </a:r>
+            <a:r>
+              <a:rPr lang="en-US" sz="1800" dirty="0" err="1">
+                <a:solidFill>
+                  <a:srgbClr val="595959"/>
+                </a:solidFill>
+                <a:effectLst/>
+                <a:latin typeface="Constantia" panose="02030602050306030303" pitchFamily="18" charset="0"/>
+                <a:ea typeface="Constantia" panose="02030602050306030303" pitchFamily="18" charset="0"/>
+                <a:cs typeface="Browallia New" panose="020B0604020202020204" pitchFamily="34" charset="-34"/>
+              </a:rPr>
+              <a:t>Behance</a:t>
+            </a:r>
+            <a:r>
+              <a:rPr lang="en-US" sz="1800" dirty="0">
+                <a:solidFill>
+                  <a:srgbClr val="595959"/>
+                </a:solidFill>
+                <a:effectLst/>
+                <a:latin typeface="Constantia" panose="02030602050306030303" pitchFamily="18" charset="0"/>
+                <a:ea typeface="Constantia" panose="02030602050306030303" pitchFamily="18" charset="0"/>
+                <a:cs typeface="Browallia New" panose="020B0604020202020204" pitchFamily="34" charset="-34"/>
+              </a:rPr>
+              <a:t>: https://www.behance.net/gallery/81048169/MOBI</a:t>
+            </a:r>
+            <a:endParaRPr lang="en-AU" sz="1800" dirty="0">
+              <a:solidFill>
+                <a:srgbClr val="595959"/>
+              </a:solidFill>
+              <a:effectLst/>
+              <a:latin typeface="Constantia" panose="02030602050306030303" pitchFamily="18" charset="0"/>
+              <a:ea typeface="Constantia" panose="02030602050306030303" pitchFamily="18" charset="0"/>
+              <a:cs typeface="Browallia New" panose="020B0604020202020204" pitchFamily="34" charset="-34"/>
+            </a:endParaRPr>
+          </a:p>
+          <a:p>
+            <a:pPr marL="0" indent="0">
+              <a:buNone/>
+            </a:pPr>
+            <a:endParaRPr lang="en-AU" dirty="0"/>
+          </a:p>
+        </p:txBody>
+      </p:sp>
+    </p:spTree>
+    <p:extLst>
+      <p:ext uri="{BB962C8B-B14F-4D97-AF65-F5344CB8AC3E}">
+        <p14:creationId xmlns:p14="http://schemas.microsoft.com/office/powerpoint/2010/main" val="3921474924"/>
+      </p:ext>
+    </p:extLst>
+  </p:cSld>
+  <p:clrMapOvr>
+    <a:masterClrMapping/>
+  </p:clrMapOvr>
+</p:sld>
+</file>
+
 <file path=ppt/slides/slide2.xml><?xml version="1.0" encoding="utf-8"?>
 <p:sld xmlns:a="http://schemas.openxmlformats.org/drawingml/2006/main" xmlns:r="http://schemas.openxmlformats.org/officeDocument/2006/relationships" xmlns:p="http://schemas.openxmlformats.org/presentationml/2006/main">
   <p:cSld>
@@ -6457,7 +7310,31 @@
           <a:bodyPr/>
           <a:lstStyle/>
           <a:p>
-            <a:endParaRPr lang="en-AU" dirty="0"/>
+            <a:r>
+              <a:rPr lang="en-AU" dirty="0"/>
+              <a:t>Our concept is a self-navigating shopping trolley that follows a customer through a supermarket. </a:t>
+            </a:r>
+          </a:p>
+          <a:p>
+            <a:pPr lvl="1"/>
+            <a:r>
+              <a:rPr lang="en-AU" dirty="0"/>
+              <a:t>The system will always stay within a given distance of the user</a:t>
+            </a:r>
+          </a:p>
+          <a:p>
+            <a:pPr lvl="1"/>
+            <a:r>
+              <a:rPr lang="en-AU" dirty="0"/>
+              <a:t>The system will sound an alarm if the user gets too close to the trolley</a:t>
+            </a:r>
+          </a:p>
+          <a:p>
+            <a:pPr lvl="1"/>
+            <a:r>
+              <a:rPr lang="en-AU" dirty="0"/>
+              <a:t>The system will display the distance to the user on a 7-segment display</a:t>
+            </a:r>
           </a:p>
         </p:txBody>
       </p:sp>
@@ -6496,6 +7373,105 @@
           <p:cNvPr id="2" name="Title 1">
             <a:extLst>
               <a:ext uri="{FF2B5EF4-FFF2-40B4-BE49-F238E27FC236}">
+                <a16:creationId xmlns:a16="http://schemas.microsoft.com/office/drawing/2014/main" id="{3C472C35-8145-3E47-408E-E84C524F46DD}"/>
+              </a:ext>
+            </a:extLst>
+          </p:cNvPr>
+          <p:cNvSpPr>
+            <a:spLocks noGrp="1"/>
+          </p:cNvSpPr>
+          <p:nvPr>
+            <p:ph type="title"/>
+          </p:nvPr>
+        </p:nvSpPr>
+        <p:spPr/>
+        <p:txBody>
+          <a:bodyPr/>
+          <a:lstStyle/>
+          <a:p>
+            <a:r>
+              <a:rPr lang="en-AU" dirty="0"/>
+              <a:t>Proof of Concept Technology</a:t>
+            </a:r>
+          </a:p>
+        </p:txBody>
+      </p:sp>
+      <p:sp>
+        <p:nvSpPr>
+          <p:cNvPr id="3" name="Content Placeholder 2">
+            <a:extLst>
+              <a:ext uri="{FF2B5EF4-FFF2-40B4-BE49-F238E27FC236}">
+                <a16:creationId xmlns:a16="http://schemas.microsoft.com/office/drawing/2014/main" id="{065369F9-AE8E-5CCA-7339-566BED09AABE}"/>
+              </a:ext>
+            </a:extLst>
+          </p:cNvPr>
+          <p:cNvSpPr>
+            <a:spLocks noGrp="1"/>
+          </p:cNvSpPr>
+          <p:nvPr>
+            <p:ph idx="1"/>
+          </p:nvPr>
+        </p:nvSpPr>
+        <p:spPr/>
+        <p:txBody>
+          <a:bodyPr/>
+          <a:lstStyle/>
+          <a:p>
+            <a:r>
+              <a:rPr lang="en-AU" dirty="0"/>
+              <a:t>As a proof of concept, our design will demonstrate the object tracking element of our design. </a:t>
+            </a:r>
+          </a:p>
+          <a:p>
+            <a:pPr lvl="1"/>
+            <a:r>
+              <a:rPr lang="en-AU" dirty="0"/>
+              <a:t>The system can track the user and output the distance and angle of the user. </a:t>
+            </a:r>
+          </a:p>
+          <a:p>
+            <a:r>
+              <a:rPr lang="en-AU" dirty="0"/>
+              <a:t>Our concept is queried through the terminal, allowing users to gain live updates of the system status, user distance, and user angle.</a:t>
+            </a:r>
+          </a:p>
+        </p:txBody>
+      </p:sp>
+    </p:spTree>
+    <p:extLst>
+      <p:ext uri="{BB962C8B-B14F-4D97-AF65-F5344CB8AC3E}">
+        <p14:creationId xmlns:p14="http://schemas.microsoft.com/office/powerpoint/2010/main" val="2431334284"/>
+      </p:ext>
+    </p:extLst>
+  </p:cSld>
+  <p:clrMapOvr>
+    <a:masterClrMapping/>
+  </p:clrMapOvr>
+</p:sld>
+</file>
+
+<file path=ppt/slides/slide5.xml><?xml version="1.0" encoding="utf-8"?>
+<p:sld xmlns:a="http://schemas.openxmlformats.org/drawingml/2006/main" xmlns:r="http://schemas.openxmlformats.org/officeDocument/2006/relationships" xmlns:p="http://schemas.openxmlformats.org/presentationml/2006/main">
+  <p:cSld>
+    <p:spTree>
+      <p:nvGrpSpPr>
+        <p:cNvPr id="1" name=""/>
+        <p:cNvGrpSpPr/>
+        <p:nvPr/>
+      </p:nvGrpSpPr>
+      <p:grpSpPr>
+        <a:xfrm>
+          <a:off x="0" y="0"/>
+          <a:ext cx="0" cy="0"/>
+          <a:chOff x="0" y="0"/>
+          <a:chExt cx="0" cy="0"/>
+        </a:xfrm>
+      </p:grpSpPr>
+      <p:sp>
+        <p:nvSpPr>
+          <p:cNvPr id="2" name="Title 1">
+            <a:extLst>
+              <a:ext uri="{FF2B5EF4-FFF2-40B4-BE49-F238E27FC236}">
                 <a16:creationId xmlns:a16="http://schemas.microsoft.com/office/drawing/2014/main" id="{D36E411E-8395-1A33-D797-44BDF80A1B85}"/>
               </a:ext>
             </a:extLst>
@@ -6507,9 +7483,16 @@
             <p:ph type="title"/>
           </p:nvPr>
         </p:nvSpPr>
-        <p:spPr/>
-        <p:txBody>
-          <a:bodyPr/>
+        <p:spPr>
+          <a:xfrm>
+            <a:off x="581193" y="729658"/>
+            <a:ext cx="11029616" cy="988332"/>
+          </a:xfrm>
+        </p:spPr>
+        <p:txBody>
+          <a:bodyPr anchor="b">
+            <a:normAutofit/>
+          </a:bodyPr>
           <a:lstStyle/>
           <a:p>
             <a:r>
@@ -6519,6 +7502,56 @@
           </a:p>
         </p:txBody>
       </p:sp>
+      <p:pic>
+        <p:nvPicPr>
+          <p:cNvPr id="1026" name="Picture 2" descr="shopping cart Shopping Smart Cart  product design  industrial design  Cart Design Collapsible adobeawards UI ux">
+            <a:extLst>
+              <a:ext uri="{FF2B5EF4-FFF2-40B4-BE49-F238E27FC236}">
+                <a16:creationId xmlns:a16="http://schemas.microsoft.com/office/drawing/2014/main" id="{E0BE03E3-9C69-B981-6433-0977F8459C84}"/>
+              </a:ext>
+            </a:extLst>
+          </p:cNvPr>
+          <p:cNvPicPr>
+            <a:picLocks noGrp="1" noChangeAspect="1" noChangeArrowheads="1"/>
+          </p:cNvPicPr>
+          <p:nvPr>
+            <p:ph sz="half" idx="1"/>
+          </p:nvPr>
+        </p:nvPicPr>
+        <p:blipFill>
+          <a:blip r:embed="rId2">
+            <a:extLst>
+              <a:ext uri="{28A0092B-C50C-407E-A947-70E740481C1C}">
+                <a14:useLocalDpi xmlns:a14="http://schemas.microsoft.com/office/drawing/2010/main" val="0"/>
+              </a:ext>
+            </a:extLst>
+          </a:blip>
+          <a:stretch>
+            <a:fillRect/>
+          </a:stretch>
+        </p:blipFill>
+        <p:spPr bwMode="auto">
+          <a:xfrm>
+            <a:off x="591238" y="2228003"/>
+            <a:ext cx="5402300" cy="3633047"/>
+          </a:xfrm>
+          <a:prstGeom prst="rect">
+            <a:avLst/>
+          </a:prstGeom>
+          <a:solidFill>
+            <a:srgbClr val="FFFFFF"/>
+          </a:solidFill>
+          <a:extLst>
+            <a:ext uri="{909E8E84-426E-40DD-AFC4-6F175D3DCCD1}">
+              <a14:hiddenFill xmlns:a14="http://schemas.microsoft.com/office/drawing/2010/main">
+                <a:solidFill>
+                  <a:srgbClr val="FFFFFF"/>
+                </a:solidFill>
+              </a14:hiddenFill>
+            </a:ext>
+          </a:extLst>
+        </p:spPr>
+      </p:pic>
       <p:sp>
         <p:nvSpPr>
           <p:cNvPr id="3" name="Content Placeholder 2">
@@ -6532,40 +7565,55 @@
             <a:spLocks noGrp="1"/>
           </p:cNvSpPr>
           <p:nvPr>
-            <p:ph sz="half" idx="1"/>
-          </p:nvPr>
-        </p:nvSpPr>
-        <p:spPr/>
-        <p:txBody>
-          <a:bodyPr/>
+            <p:ph sz="half" idx="2"/>
+          </p:nvPr>
+        </p:nvSpPr>
+        <p:spPr>
+          <a:xfrm>
+            <a:off x="6188417" y="2228003"/>
+            <a:ext cx="5422392" cy="3633047"/>
+          </a:xfrm>
+        </p:spPr>
+        <p:txBody>
+          <a:bodyPr anchor="ctr">
+            <a:normAutofit fontScale="92500" lnSpcReduction="10000"/>
+          </a:bodyPr>
           <a:lstStyle/>
           <a:p>
-            <a:endParaRPr lang="en-AU"/>
-          </a:p>
-        </p:txBody>
-      </p:sp>
-      <p:sp>
-        <p:nvSpPr>
-          <p:cNvPr id="4" name="Content Placeholder 3">
-            <a:extLst>
-              <a:ext uri="{FF2B5EF4-FFF2-40B4-BE49-F238E27FC236}">
-                <a16:creationId xmlns:a16="http://schemas.microsoft.com/office/drawing/2014/main" id="{33D427CD-5ECA-9171-280C-DED826A65652}"/>
-              </a:ext>
-            </a:extLst>
-          </p:cNvPr>
-          <p:cNvSpPr>
-            <a:spLocks noGrp="1"/>
-          </p:cNvSpPr>
-          <p:nvPr>
-            <p:ph sz="half" idx="2"/>
-          </p:nvPr>
-        </p:nvSpPr>
-        <p:spPr/>
-        <p:txBody>
-          <a:bodyPr/>
-          <a:lstStyle/>
-          <a:p>
-            <a:endParaRPr lang="en-AU"/>
+            <a:r>
+              <a:rPr lang="en-AU" dirty="0"/>
+              <a:t>With increasing automation of shopping experiences, there is little room left for innovation. </a:t>
+            </a:r>
+          </a:p>
+          <a:p>
+            <a:r>
+              <a:rPr lang="en-AU" dirty="0"/>
+              <a:t>There is room however in accessibility and ease of access. </a:t>
+            </a:r>
+          </a:p>
+          <a:p>
+            <a:pPr lvl="1"/>
+            <a:r>
+              <a:rPr lang="en-AU" sz="1800" dirty="0"/>
+              <a:t>The age of convenience constantly demands ease of use</a:t>
+            </a:r>
+          </a:p>
+          <a:p>
+            <a:pPr lvl="1"/>
+            <a:endParaRPr lang="en-AU" sz="1800" dirty="0"/>
+          </a:p>
+          <a:p>
+            <a:r>
+              <a:rPr lang="en-AU" dirty="0"/>
+              <a:t>The market has some competition [1] (see MOBI on right), although these systems rely on GPS tracking of mobile devices rather than object detection.</a:t>
+            </a:r>
+          </a:p>
+          <a:p>
+            <a:pPr lvl="1"/>
+            <a:r>
+              <a:rPr lang="en-AU" dirty="0"/>
+              <a:t>As a result, our system will have greater market penetration as a result of better usability.</a:t>
+            </a:r>
           </a:p>
         </p:txBody>
       </p:sp>
@@ -6582,7 +7630,7 @@
 </p:sld>
 </file>
 
-<file path=ppt/slides/slide5.xml><?xml version="1.0" encoding="utf-8"?>
+<file path=ppt/slides/slide6.xml><?xml version="1.0" encoding="utf-8"?>
 <p:sld xmlns:a="http://schemas.openxmlformats.org/drawingml/2006/main" xmlns:r="http://schemas.openxmlformats.org/officeDocument/2006/relationships" xmlns:p="http://schemas.openxmlformats.org/presentationml/2006/main">
   <p:cSld>
     <p:spTree>
@@ -6711,7 +7759,7 @@
 </p:sld>
 </file>
 
-<file path=ppt/slides/slide6.xml><?xml version="1.0" encoding="utf-8"?>
+<file path=ppt/slides/slide7.xml><?xml version="1.0" encoding="utf-8"?>
 <p:sld xmlns:a="http://schemas.openxmlformats.org/drawingml/2006/main" xmlns:r="http://schemas.openxmlformats.org/officeDocument/2006/relationships" xmlns:p="http://schemas.openxmlformats.org/presentationml/2006/main">
   <p:cSld>
     <p:spTree>
@@ -6827,145 +7875,6 @@
 </p:sld>
 </file>
 
-<file path=ppt/slides/slide7.xml><?xml version="1.0" encoding="utf-8"?>
-<p:sld xmlns:a="http://schemas.openxmlformats.org/drawingml/2006/main" xmlns:r="http://schemas.openxmlformats.org/officeDocument/2006/relationships" xmlns:p="http://schemas.openxmlformats.org/presentationml/2006/main">
-  <p:cSld>
-    <p:spTree>
-      <p:nvGrpSpPr>
-        <p:cNvPr id="1" name=""/>
-        <p:cNvGrpSpPr/>
-        <p:nvPr/>
-      </p:nvGrpSpPr>
-      <p:grpSpPr>
-        <a:xfrm>
-          <a:off x="0" y="0"/>
-          <a:ext cx="0" cy="0"/>
-          <a:chOff x="0" y="0"/>
-          <a:chExt cx="0" cy="0"/>
-        </a:xfrm>
-      </p:grpSpPr>
-      <p:sp>
-        <p:nvSpPr>
-          <p:cNvPr id="2" name="Title 1">
-            <a:extLst>
-              <a:ext uri="{FF2B5EF4-FFF2-40B4-BE49-F238E27FC236}">
-                <a16:creationId xmlns:a16="http://schemas.microsoft.com/office/drawing/2014/main" id="{CD79B184-8B8E-9E81-E3F8-55D524546E62}"/>
-              </a:ext>
-            </a:extLst>
-          </p:cNvPr>
-          <p:cNvSpPr>
-            <a:spLocks noGrp="1"/>
-          </p:cNvSpPr>
-          <p:nvPr>
-            <p:ph type="title"/>
-          </p:nvPr>
-        </p:nvSpPr>
-        <p:spPr/>
-        <p:txBody>
-          <a:bodyPr/>
-          <a:lstStyle/>
-          <a:p>
-            <a:r>
-              <a:rPr lang="en-AU" dirty="0"/>
-              <a:t>Module Design</a:t>
-            </a:r>
-          </a:p>
-        </p:txBody>
-      </p:sp>
-      <p:sp>
-        <p:nvSpPr>
-          <p:cNvPr id="3" name="Content Placeholder 2">
-            <a:extLst>
-              <a:ext uri="{FF2B5EF4-FFF2-40B4-BE49-F238E27FC236}">
-                <a16:creationId xmlns:a16="http://schemas.microsoft.com/office/drawing/2014/main" id="{5D25CDAD-3CCF-1038-25DE-9C3520690121}"/>
-              </a:ext>
-            </a:extLst>
-          </p:cNvPr>
-          <p:cNvSpPr>
-            <a:spLocks noGrp="1"/>
-          </p:cNvSpPr>
-          <p:nvPr>
-            <p:ph idx="1"/>
-          </p:nvPr>
-        </p:nvSpPr>
-        <p:spPr/>
-        <p:txBody>
-          <a:bodyPr/>
-          <a:lstStyle/>
-          <a:p>
-            <a:pPr marL="0" indent="0">
-              <a:buNone/>
-            </a:pPr>
-            <a:r>
-              <a:rPr lang="en-AU" dirty="0"/>
-              <a:t>Our project has been split into five modules: </a:t>
-            </a:r>
-          </a:p>
-          <a:p>
-            <a:pPr marL="342900" indent="-342900">
-              <a:buFont typeface="+mj-lt"/>
-              <a:buAutoNum type="arabicPeriod"/>
-            </a:pPr>
-            <a:r>
-              <a:rPr lang="en-AU" dirty="0"/>
-              <a:t> Serial module: handles error outputs, user queries and outputs corresponding messages</a:t>
-            </a:r>
-          </a:p>
-          <a:p>
-            <a:pPr marL="342900" indent="-342900">
-              <a:buFont typeface="+mj-lt"/>
-              <a:buAutoNum type="arabicPeriod"/>
-            </a:pPr>
-            <a:r>
-              <a:rPr lang="en-AU" dirty="0"/>
-              <a:t>Sound &amp; visual module: flashes and beeps corresponding to user distance from system </a:t>
-            </a:r>
-          </a:p>
-          <a:p>
-            <a:pPr marL="342900" indent="-342900">
-              <a:buFont typeface="+mj-lt"/>
-              <a:buAutoNum type="arabicPeriod"/>
-            </a:pPr>
-            <a:r>
-              <a:rPr lang="en-AU" dirty="0"/>
-              <a:t>Status module: monitors orientation and acceleration of system </a:t>
-            </a:r>
-          </a:p>
-          <a:p>
-            <a:pPr marL="342900" indent="-342900">
-              <a:buFont typeface="+mj-lt"/>
-              <a:buAutoNum type="arabicPeriod"/>
-            </a:pPr>
-            <a:r>
-              <a:rPr lang="en-AU" dirty="0"/>
-              <a:t>Object detection module: detects an object in front of the system </a:t>
-            </a:r>
-          </a:p>
-          <a:p>
-            <a:pPr marL="342900" indent="-342900">
-              <a:buFont typeface="+mj-lt"/>
-              <a:buAutoNum type="arabicPeriod"/>
-            </a:pPr>
-            <a:r>
-              <a:rPr lang="en-AU" dirty="0"/>
-              <a:t>Tracking module:  tracks position of object</a:t>
-            </a:r>
-          </a:p>
-        </p:txBody>
-      </p:sp>
-    </p:spTree>
-    <p:extLst>
-      <p:ext uri="{BB962C8B-B14F-4D97-AF65-F5344CB8AC3E}">
-        <p14:creationId xmlns:p14="http://schemas.microsoft.com/office/powerpoint/2010/main" val="3359701772"/>
-      </p:ext>
-    </p:extLst>
-  </p:cSld>
-  <p:clrMapOvr>
-    <a:masterClrMapping/>
-  </p:clrMapOvr>
-</p:sld>
-</file>
-
 <file path=ppt/slides/slide8.xml><?xml version="1.0" encoding="utf-8"?>
 <p:sld xmlns:a="http://schemas.openxmlformats.org/drawingml/2006/main" xmlns:r="http://schemas.openxmlformats.org/officeDocument/2006/relationships" xmlns:p="http://schemas.openxmlformats.org/presentationml/2006/main">
   <p:cSld>
@@ -6988,6 +7897,145 @@
           <p:cNvPr id="2" name="Title 1">
             <a:extLst>
               <a:ext uri="{FF2B5EF4-FFF2-40B4-BE49-F238E27FC236}">
+                <a16:creationId xmlns:a16="http://schemas.microsoft.com/office/drawing/2014/main" id="{CD79B184-8B8E-9E81-E3F8-55D524546E62}"/>
+              </a:ext>
+            </a:extLst>
+          </p:cNvPr>
+          <p:cNvSpPr>
+            <a:spLocks noGrp="1"/>
+          </p:cNvSpPr>
+          <p:nvPr>
+            <p:ph type="title"/>
+          </p:nvPr>
+        </p:nvSpPr>
+        <p:spPr/>
+        <p:txBody>
+          <a:bodyPr/>
+          <a:lstStyle/>
+          <a:p>
+            <a:r>
+              <a:rPr lang="en-AU" dirty="0"/>
+              <a:t>Module Design</a:t>
+            </a:r>
+          </a:p>
+        </p:txBody>
+      </p:sp>
+      <p:sp>
+        <p:nvSpPr>
+          <p:cNvPr id="3" name="Content Placeholder 2">
+            <a:extLst>
+              <a:ext uri="{FF2B5EF4-FFF2-40B4-BE49-F238E27FC236}">
+                <a16:creationId xmlns:a16="http://schemas.microsoft.com/office/drawing/2014/main" id="{5D25CDAD-3CCF-1038-25DE-9C3520690121}"/>
+              </a:ext>
+            </a:extLst>
+          </p:cNvPr>
+          <p:cNvSpPr>
+            <a:spLocks noGrp="1"/>
+          </p:cNvSpPr>
+          <p:nvPr>
+            <p:ph idx="1"/>
+          </p:nvPr>
+        </p:nvSpPr>
+        <p:spPr/>
+        <p:txBody>
+          <a:bodyPr/>
+          <a:lstStyle/>
+          <a:p>
+            <a:pPr marL="0" indent="0">
+              <a:buNone/>
+            </a:pPr>
+            <a:r>
+              <a:rPr lang="en-AU" dirty="0"/>
+              <a:t>Our project has been split into five modules: </a:t>
+            </a:r>
+          </a:p>
+          <a:p>
+            <a:pPr marL="342900" indent="-342900">
+              <a:buFont typeface="+mj-lt"/>
+              <a:buAutoNum type="arabicPeriod"/>
+            </a:pPr>
+            <a:r>
+              <a:rPr lang="en-AU" dirty="0"/>
+              <a:t> Serial module: handles error outputs, user queries and outputs corresponding messages</a:t>
+            </a:r>
+          </a:p>
+          <a:p>
+            <a:pPr marL="342900" indent="-342900">
+              <a:buFont typeface="+mj-lt"/>
+              <a:buAutoNum type="arabicPeriod"/>
+            </a:pPr>
+            <a:r>
+              <a:rPr lang="en-AU" dirty="0"/>
+              <a:t>Sound &amp; visual module: flashes and beeps corresponding to user distance from system </a:t>
+            </a:r>
+          </a:p>
+          <a:p>
+            <a:pPr marL="342900" indent="-342900">
+              <a:buFont typeface="+mj-lt"/>
+              <a:buAutoNum type="arabicPeriod"/>
+            </a:pPr>
+            <a:r>
+              <a:rPr lang="en-AU" dirty="0"/>
+              <a:t>Status module: monitors orientation and acceleration of system </a:t>
+            </a:r>
+          </a:p>
+          <a:p>
+            <a:pPr marL="342900" indent="-342900">
+              <a:buFont typeface="+mj-lt"/>
+              <a:buAutoNum type="arabicPeriod"/>
+            </a:pPr>
+            <a:r>
+              <a:rPr lang="en-AU" dirty="0"/>
+              <a:t>Object detection module: detects an object in front of the system </a:t>
+            </a:r>
+          </a:p>
+          <a:p>
+            <a:pPr marL="342900" indent="-342900">
+              <a:buFont typeface="+mj-lt"/>
+              <a:buAutoNum type="arabicPeriod"/>
+            </a:pPr>
+            <a:r>
+              <a:rPr lang="en-AU" dirty="0"/>
+              <a:t>Control module:  tracks position of object and outputs distance/angle of object</a:t>
+            </a:r>
+          </a:p>
+        </p:txBody>
+      </p:sp>
+    </p:spTree>
+    <p:extLst>
+      <p:ext uri="{BB962C8B-B14F-4D97-AF65-F5344CB8AC3E}">
+        <p14:creationId xmlns:p14="http://schemas.microsoft.com/office/powerpoint/2010/main" val="3359701772"/>
+      </p:ext>
+    </p:extLst>
+  </p:cSld>
+  <p:clrMapOvr>
+    <a:masterClrMapping/>
+  </p:clrMapOvr>
+</p:sld>
+</file>
+
+<file path=ppt/slides/slide9.xml><?xml version="1.0" encoding="utf-8"?>
+<p:sld xmlns:a="http://schemas.openxmlformats.org/drawingml/2006/main" xmlns:r="http://schemas.openxmlformats.org/officeDocument/2006/relationships" xmlns:p="http://schemas.openxmlformats.org/presentationml/2006/main">
+  <p:cSld>
+    <p:spTree>
+      <p:nvGrpSpPr>
+        <p:cNvPr id="1" name=""/>
+        <p:cNvGrpSpPr/>
+        <p:nvPr/>
+      </p:nvGrpSpPr>
+      <p:grpSpPr>
+        <a:xfrm>
+          <a:off x="0" y="0"/>
+          <a:ext cx="0" cy="0"/>
+          <a:chOff x="0" y="0"/>
+          <a:chExt cx="0" cy="0"/>
+        </a:xfrm>
+      </p:grpSpPr>
+      <p:sp>
+        <p:nvSpPr>
+          <p:cNvPr id="2" name="Title 1">
+            <a:extLst>
+              <a:ext uri="{FF2B5EF4-FFF2-40B4-BE49-F238E27FC236}">
                 <a16:creationId xmlns:a16="http://schemas.microsoft.com/office/drawing/2014/main" id="{98A9B203-127A-E90B-7FDE-2A27A0C7FD1F}"/>
               </a:ext>
             </a:extLst>
@@ -7027,7 +8075,7 @@
             <p:ph sz="half" idx="1"/>
             <p:extLst>
               <p:ext uri="{D42A27DB-BD31-4B8C-83A1-F6EECF244321}">
-                <p14:modId xmlns:p14="http://schemas.microsoft.com/office/powerpoint/2010/main" val="3809391605"/>
+                <p14:modId xmlns:p14="http://schemas.microsoft.com/office/powerpoint/2010/main" val="2153057965"/>
               </p:ext>
             </p:extLst>
           </p:nvPr>
@@ -7402,7 +8450,7 @@
                     <a:p>
                       <a:r>
                         <a:rPr lang="en-AU" sz="1600" dirty="0"/>
-                        <a:t>Object Tracking Module</a:t>
+                        <a:t>Control Module</a:t>
                       </a:r>
                     </a:p>
                   </a:txBody>
@@ -7485,558 +8533,6 @@
     <p:extLst>
       <p:ext uri="{BB962C8B-B14F-4D97-AF65-F5344CB8AC3E}">
         <p14:creationId xmlns:p14="http://schemas.microsoft.com/office/powerpoint/2010/main" val="1806934946"/>
-      </p:ext>
-    </p:extLst>
-  </p:cSld>
-  <p:clrMapOvr>
-    <a:masterClrMapping/>
-  </p:clrMapOvr>
-</p:sld>
-</file>
-
-<file path=ppt/slides/slide9.xml><?xml version="1.0" encoding="utf-8"?>
-<p:sld xmlns:a="http://schemas.openxmlformats.org/drawingml/2006/main" xmlns:r="http://schemas.openxmlformats.org/officeDocument/2006/relationships" xmlns:p="http://schemas.openxmlformats.org/presentationml/2006/main">
-  <p:cSld>
-    <p:spTree>
-      <p:nvGrpSpPr>
-        <p:cNvPr id="1" name=""/>
-        <p:cNvGrpSpPr/>
-        <p:nvPr/>
-      </p:nvGrpSpPr>
-      <p:grpSpPr>
-        <a:xfrm>
-          <a:off x="0" y="0"/>
-          <a:ext cx="0" cy="0"/>
-          <a:chOff x="0" y="0"/>
-          <a:chExt cx="0" cy="0"/>
-        </a:xfrm>
-      </p:grpSpPr>
-      <p:sp>
-        <p:nvSpPr>
-          <p:cNvPr id="2" name="Title 1">
-            <a:extLst>
-              <a:ext uri="{FF2B5EF4-FFF2-40B4-BE49-F238E27FC236}">
-                <a16:creationId xmlns:a16="http://schemas.microsoft.com/office/drawing/2014/main" id="{6DA39524-6704-D260-3946-C5F2AF0D6D79}"/>
-              </a:ext>
-            </a:extLst>
-          </p:cNvPr>
-          <p:cNvSpPr>
-            <a:spLocks noGrp="1"/>
-          </p:cNvSpPr>
-          <p:nvPr>
-            <p:ph type="title"/>
-          </p:nvPr>
-        </p:nvSpPr>
-        <p:spPr/>
-        <p:txBody>
-          <a:bodyPr/>
-          <a:lstStyle/>
-          <a:p>
-            <a:r>
-              <a:rPr lang="en-AU" dirty="0"/>
-              <a:t>Roles and Responsibilities </a:t>
-            </a:r>
-          </a:p>
-        </p:txBody>
-      </p:sp>
-      <p:sp>
-        <p:nvSpPr>
-          <p:cNvPr id="3" name="Content Placeholder 2">
-            <a:extLst>
-              <a:ext uri="{FF2B5EF4-FFF2-40B4-BE49-F238E27FC236}">
-                <a16:creationId xmlns:a16="http://schemas.microsoft.com/office/drawing/2014/main" id="{539B4EA0-6377-956A-38C4-EECB0B2BAD94}"/>
-              </a:ext>
-            </a:extLst>
-          </p:cNvPr>
-          <p:cNvSpPr>
-            <a:spLocks noGrp="1"/>
-          </p:cNvSpPr>
-          <p:nvPr>
-            <p:ph idx="1"/>
-          </p:nvPr>
-        </p:nvSpPr>
-        <p:spPr/>
-        <p:txBody>
-          <a:bodyPr anchor="t"/>
-          <a:lstStyle/>
-          <a:p>
-            <a:pPr marL="0" indent="0">
-              <a:buNone/>
-            </a:pPr>
-            <a:r>
-              <a:rPr lang="en-AU" dirty="0"/>
-              <a:t>Roles for this project were spread evenly among the group, with each member acting as the primary for one module.</a:t>
-            </a:r>
-          </a:p>
-          <a:p>
-            <a:pPr marL="0" indent="0">
-              <a:buNone/>
-            </a:pPr>
-            <a:endParaRPr lang="en-AU" dirty="0"/>
-          </a:p>
-        </p:txBody>
-      </p:sp>
-      <p:graphicFrame>
-        <p:nvGraphicFramePr>
-          <p:cNvPr id="4" name="Table 4">
-            <a:extLst>
-              <a:ext uri="{FF2B5EF4-FFF2-40B4-BE49-F238E27FC236}">
-                <a16:creationId xmlns:a16="http://schemas.microsoft.com/office/drawing/2014/main" id="{3418FF52-86B3-557B-4765-2D4C13089BCD}"/>
-              </a:ext>
-            </a:extLst>
-          </p:cNvPr>
-          <p:cNvGraphicFramePr>
-            <a:graphicFrameLocks noGrp="1"/>
-          </p:cNvGraphicFramePr>
-          <p:nvPr>
-            <p:extLst>
-              <p:ext uri="{D42A27DB-BD31-4B8C-83A1-F6EECF244321}">
-                <p14:modId xmlns:p14="http://schemas.microsoft.com/office/powerpoint/2010/main" val="4182003439"/>
-              </p:ext>
-            </p:extLst>
-          </p:nvPr>
-        </p:nvGraphicFramePr>
-        <p:xfrm>
-          <a:off x="2031999" y="2721707"/>
-          <a:ext cx="8128000" cy="3403600"/>
-        </p:xfrm>
-        <a:graphic>
-          <a:graphicData uri="http://schemas.openxmlformats.org/drawingml/2006/table">
-            <a:tbl>
-              <a:tblPr firstRow="1" bandRow="1">
-                <a:tableStyleId>{5C22544A-7EE6-4342-B048-85BDC9FD1C3A}</a:tableStyleId>
-              </a:tblPr>
-              <a:tblGrid>
-                <a:gridCol w="2032000">
-                  <a:extLst>
-                    <a:ext uri="{9D8B030D-6E8A-4147-A177-3AD203B41FA5}">
-                      <a16:colId xmlns:a16="http://schemas.microsoft.com/office/drawing/2014/main" val="3894842504"/>
-                    </a:ext>
-                  </a:extLst>
-                </a:gridCol>
-                <a:gridCol w="2032000">
-                  <a:extLst>
-                    <a:ext uri="{9D8B030D-6E8A-4147-A177-3AD203B41FA5}">
-                      <a16:colId xmlns:a16="http://schemas.microsoft.com/office/drawing/2014/main" val="961461861"/>
-                    </a:ext>
-                  </a:extLst>
-                </a:gridCol>
-                <a:gridCol w="2032000">
-                  <a:extLst>
-                    <a:ext uri="{9D8B030D-6E8A-4147-A177-3AD203B41FA5}">
-                      <a16:colId xmlns:a16="http://schemas.microsoft.com/office/drawing/2014/main" val="779492511"/>
-                    </a:ext>
-                  </a:extLst>
-                </a:gridCol>
-                <a:gridCol w="2032000">
-                  <a:extLst>
-                    <a:ext uri="{9D8B030D-6E8A-4147-A177-3AD203B41FA5}">
-                      <a16:colId xmlns:a16="http://schemas.microsoft.com/office/drawing/2014/main" val="1893478059"/>
-                    </a:ext>
-                  </a:extLst>
-                </a:gridCol>
-              </a:tblGrid>
-              <a:tr h="370840">
-                <a:tc>
-                  <a:txBody>
-                    <a:bodyPr/>
-                    <a:lstStyle/>
-                    <a:p>
-                      <a:r>
-                        <a:rPr lang="en-AU" dirty="0"/>
-                        <a:t>Roles</a:t>
-                      </a:r>
-                    </a:p>
-                  </a:txBody>
-                  <a:tcPr/>
-                </a:tc>
-                <a:tc>
-                  <a:txBody>
-                    <a:bodyPr/>
-                    <a:lstStyle/>
-                    <a:p>
-                      <a:r>
-                        <a:rPr lang="en-AU" dirty="0"/>
-                        <a:t>Primary</a:t>
-                      </a:r>
-                    </a:p>
-                  </a:txBody>
-                  <a:tcPr/>
-                </a:tc>
-                <a:tc>
-                  <a:txBody>
-                    <a:bodyPr/>
-                    <a:lstStyle/>
-                    <a:p>
-                      <a:r>
-                        <a:rPr lang="en-AU" dirty="0"/>
-                        <a:t>Secondary</a:t>
-                      </a:r>
-                    </a:p>
-                  </a:txBody>
-                  <a:tcPr/>
-                </a:tc>
-                <a:tc>
-                  <a:txBody>
-                    <a:bodyPr/>
-                    <a:lstStyle/>
-                    <a:p>
-                      <a:r>
-                        <a:rPr lang="en-AU" dirty="0"/>
-                        <a:t>Support</a:t>
-                      </a:r>
-                    </a:p>
-                  </a:txBody>
-                  <a:tcPr/>
-                </a:tc>
-                <a:extLst>
-                  <a:ext uri="{0D108BD9-81ED-4DB2-BD59-A6C34878D82A}">
-                    <a16:rowId xmlns:a16="http://schemas.microsoft.com/office/drawing/2014/main" val="1583112351"/>
-                  </a:ext>
-                </a:extLst>
-              </a:tr>
-              <a:tr h="370840">
-                <a:tc>
-                  <a:txBody>
-                    <a:bodyPr/>
-                    <a:lstStyle/>
-                    <a:p>
-                      <a:r>
-                        <a:rPr lang="en-AU" dirty="0"/>
-                        <a:t>Serial module</a:t>
-                      </a:r>
-                    </a:p>
-                  </a:txBody>
-                  <a:tcPr/>
-                </a:tc>
-                <a:tc>
-                  <a:txBody>
-                    <a:bodyPr/>
-                    <a:lstStyle/>
-                    <a:p>
-                      <a:r>
-                        <a:rPr lang="en-AU" dirty="0"/>
-                        <a:t>Will</a:t>
-                      </a:r>
-                    </a:p>
-                  </a:txBody>
-                  <a:tcPr/>
-                </a:tc>
-                <a:tc>
-                  <a:txBody>
-                    <a:bodyPr/>
-                    <a:lstStyle/>
-                    <a:p>
-                      <a:r>
-                        <a:rPr lang="en-AU" dirty="0"/>
-                        <a:t>Joon</a:t>
-                      </a:r>
-                    </a:p>
-                  </a:txBody>
-                  <a:tcPr/>
-                </a:tc>
-                <a:tc>
-                  <a:txBody>
-                    <a:bodyPr/>
-                    <a:lstStyle/>
-                    <a:p>
-                      <a:endParaRPr lang="en-AU"/>
-                    </a:p>
-                  </a:txBody>
-                  <a:tcPr/>
-                </a:tc>
-                <a:extLst>
-                  <a:ext uri="{0D108BD9-81ED-4DB2-BD59-A6C34878D82A}">
-                    <a16:rowId xmlns:a16="http://schemas.microsoft.com/office/drawing/2014/main" val="2116312314"/>
-                  </a:ext>
-                </a:extLst>
-              </a:tr>
-              <a:tr h="370840">
-                <a:tc>
-                  <a:txBody>
-                    <a:bodyPr/>
-                    <a:lstStyle/>
-                    <a:p>
-                      <a:r>
-                        <a:rPr lang="en-AU" dirty="0"/>
-                        <a:t>Audio/visual module</a:t>
-                      </a:r>
-                    </a:p>
-                  </a:txBody>
-                  <a:tcPr/>
-                </a:tc>
-                <a:tc>
-                  <a:txBody>
-                    <a:bodyPr/>
-                    <a:lstStyle/>
-                    <a:p>
-                      <a:r>
-                        <a:rPr lang="en-AU" dirty="0"/>
-                        <a:t>Ethan</a:t>
-                      </a:r>
-                    </a:p>
-                  </a:txBody>
-                  <a:tcPr/>
-                </a:tc>
-                <a:tc>
-                  <a:txBody>
-                    <a:bodyPr/>
-                    <a:lstStyle/>
-                    <a:p>
-                      <a:endParaRPr lang="en-AU" dirty="0"/>
-                    </a:p>
-                  </a:txBody>
-                  <a:tcPr/>
-                </a:tc>
-                <a:tc>
-                  <a:txBody>
-                    <a:bodyPr/>
-                    <a:lstStyle/>
-                    <a:p>
-                      <a:endParaRPr lang="en-AU"/>
-                    </a:p>
-                  </a:txBody>
-                  <a:tcPr/>
-                </a:tc>
-                <a:extLst>
-                  <a:ext uri="{0D108BD9-81ED-4DB2-BD59-A6C34878D82A}">
-                    <a16:rowId xmlns:a16="http://schemas.microsoft.com/office/drawing/2014/main" val="3773811662"/>
-                  </a:ext>
-                </a:extLst>
-              </a:tr>
-              <a:tr h="370840">
-                <a:tc>
-                  <a:txBody>
-                    <a:bodyPr/>
-                    <a:lstStyle/>
-                    <a:p>
-                      <a:r>
-                        <a:rPr lang="en-AU" dirty="0"/>
-                        <a:t>Status module </a:t>
-                      </a:r>
-                    </a:p>
-                  </a:txBody>
-                  <a:tcPr/>
-                </a:tc>
-                <a:tc>
-                  <a:txBody>
-                    <a:bodyPr/>
-                    <a:lstStyle/>
-                    <a:p>
-                      <a:r>
-                        <a:rPr lang="en-AU" dirty="0"/>
-                        <a:t>Joon</a:t>
-                      </a:r>
-                    </a:p>
-                  </a:txBody>
-                  <a:tcPr/>
-                </a:tc>
-                <a:tc>
-                  <a:txBody>
-                    <a:bodyPr/>
-                    <a:lstStyle/>
-                    <a:p>
-                      <a:endParaRPr lang="en-AU"/>
-                    </a:p>
-                  </a:txBody>
-                  <a:tcPr/>
-                </a:tc>
-                <a:tc>
-                  <a:txBody>
-                    <a:bodyPr/>
-                    <a:lstStyle/>
-                    <a:p>
-                      <a:endParaRPr lang="en-AU"/>
-                    </a:p>
-                  </a:txBody>
-                  <a:tcPr/>
-                </a:tc>
-                <a:extLst>
-                  <a:ext uri="{0D108BD9-81ED-4DB2-BD59-A6C34878D82A}">
-                    <a16:rowId xmlns:a16="http://schemas.microsoft.com/office/drawing/2014/main" val="2315356098"/>
-                  </a:ext>
-                </a:extLst>
-              </a:tr>
-              <a:tr h="370840">
-                <a:tc>
-                  <a:txBody>
-                    <a:bodyPr/>
-                    <a:lstStyle/>
-                    <a:p>
-                      <a:r>
-                        <a:rPr lang="en-AU"/>
-                        <a:t>Object tracking </a:t>
-                      </a:r>
-                      <a:r>
-                        <a:rPr lang="en-AU" dirty="0"/>
-                        <a:t>module</a:t>
-                      </a:r>
-                    </a:p>
-                  </a:txBody>
-                  <a:tcPr/>
-                </a:tc>
-                <a:tc>
-                  <a:txBody>
-                    <a:bodyPr/>
-                    <a:lstStyle/>
-                    <a:p>
-                      <a:r>
-                        <a:rPr lang="en-AU" dirty="0"/>
-                        <a:t>Taj</a:t>
-                      </a:r>
-                    </a:p>
-                  </a:txBody>
-                  <a:tcPr/>
-                </a:tc>
-                <a:tc>
-                  <a:txBody>
-                    <a:bodyPr/>
-                    <a:lstStyle/>
-                    <a:p>
-                      <a:r>
-                        <a:rPr lang="en-AU" dirty="0"/>
-                        <a:t>Josh</a:t>
-                      </a:r>
-                    </a:p>
-                  </a:txBody>
-                  <a:tcPr/>
-                </a:tc>
-                <a:tc>
-                  <a:txBody>
-                    <a:bodyPr/>
-                    <a:lstStyle/>
-                    <a:p>
-                      <a:endParaRPr lang="en-AU"/>
-                    </a:p>
-                  </a:txBody>
-                  <a:tcPr/>
-                </a:tc>
-                <a:extLst>
-                  <a:ext uri="{0D108BD9-81ED-4DB2-BD59-A6C34878D82A}">
-                    <a16:rowId xmlns:a16="http://schemas.microsoft.com/office/drawing/2014/main" val="3415284574"/>
-                  </a:ext>
-                </a:extLst>
-              </a:tr>
-              <a:tr h="370840">
-                <a:tc>
-                  <a:txBody>
-                    <a:bodyPr/>
-                    <a:lstStyle/>
-                    <a:p>
-                      <a:r>
-                        <a:rPr lang="en-AU" dirty="0"/>
-                        <a:t>Object detection module</a:t>
-                      </a:r>
-                    </a:p>
-                  </a:txBody>
-                  <a:tcPr/>
-                </a:tc>
-                <a:tc>
-                  <a:txBody>
-                    <a:bodyPr/>
-                    <a:lstStyle/>
-                    <a:p>
-                      <a:r>
-                        <a:rPr lang="en-AU" dirty="0"/>
-                        <a:t>Josh</a:t>
-                      </a:r>
-                    </a:p>
-                  </a:txBody>
-                  <a:tcPr/>
-                </a:tc>
-                <a:tc>
-                  <a:txBody>
-                    <a:bodyPr/>
-                    <a:lstStyle/>
-                    <a:p>
-                      <a:r>
-                        <a:rPr lang="en-AU" dirty="0"/>
-                        <a:t>Taj</a:t>
-                      </a:r>
-                    </a:p>
-                  </a:txBody>
-                  <a:tcPr/>
-                </a:tc>
-                <a:tc>
-                  <a:txBody>
-                    <a:bodyPr/>
-                    <a:lstStyle/>
-                    <a:p>
-                      <a:endParaRPr lang="en-AU"/>
-                    </a:p>
-                  </a:txBody>
-                  <a:tcPr/>
-                </a:tc>
-                <a:extLst>
-                  <a:ext uri="{0D108BD9-81ED-4DB2-BD59-A6C34878D82A}">
-                    <a16:rowId xmlns:a16="http://schemas.microsoft.com/office/drawing/2014/main" val="982157175"/>
-                  </a:ext>
-                </a:extLst>
-              </a:tr>
-              <a:tr h="370840">
-                <a:tc>
-                  <a:txBody>
-                    <a:bodyPr/>
-                    <a:lstStyle/>
-                    <a:p>
-                      <a:r>
-                        <a:rPr lang="en-AU" dirty="0"/>
-                        <a:t>Documentation</a:t>
-                      </a:r>
-                    </a:p>
-                  </a:txBody>
-                  <a:tcPr/>
-                </a:tc>
-                <a:tc>
-                  <a:txBody>
-                    <a:bodyPr/>
-                    <a:lstStyle/>
-                    <a:p>
-                      <a:r>
-                        <a:rPr lang="en-AU" dirty="0"/>
-                        <a:t>Will</a:t>
-                      </a:r>
-                    </a:p>
-                  </a:txBody>
-                  <a:tcPr/>
-                </a:tc>
-                <a:tc>
-                  <a:txBody>
-                    <a:bodyPr/>
-                    <a:lstStyle/>
-                    <a:p>
-                      <a:r>
-                        <a:rPr lang="en-AU" dirty="0"/>
-                        <a:t>Ethan</a:t>
-                      </a:r>
-                    </a:p>
-                  </a:txBody>
-                  <a:tcPr/>
-                </a:tc>
-                <a:tc>
-                  <a:txBody>
-                    <a:bodyPr/>
-                    <a:lstStyle/>
-                    <a:p>
-                      <a:endParaRPr lang="en-AU" dirty="0"/>
-                    </a:p>
-                  </a:txBody>
-                  <a:tcPr/>
-                </a:tc>
-                <a:extLst>
-                  <a:ext uri="{0D108BD9-81ED-4DB2-BD59-A6C34878D82A}">
-                    <a16:rowId xmlns:a16="http://schemas.microsoft.com/office/drawing/2014/main" val="3342758123"/>
-                  </a:ext>
-                </a:extLst>
-              </a:tr>
-            </a:tbl>
-          </a:graphicData>
-        </a:graphic>
-      </p:graphicFrame>
-    </p:spTree>
-    <p:extLst>
-      <p:ext uri="{BB962C8B-B14F-4D97-AF65-F5344CB8AC3E}">
-        <p14:creationId xmlns:p14="http://schemas.microsoft.com/office/powerpoint/2010/main" val="3060279616"/>
       </p:ext>
     </p:extLst>
   </p:cSld>

</xml_diff>

<commit_message>
Psuedo code for control module
</commit_message>
<xml_diff>
--- a/Design and Pseudocode Materials/Major Project Presentation.pptx
+++ b/Design and Pseudocode Materials/Major Project Presentation.pptx
@@ -233,7 +233,7 @@
           <a:p>
             <a:fld id="{AF869721-F543-4A6C-BF9D-65D7CC540427}" type="datetimeFigureOut">
               <a:rPr lang="en-US" smtClean="0"/>
-              <a:t>5/24/2022</a:t>
+              <a:t>5/25/22</a:t>
             </a:fld>
             <a:endParaRPr lang="en-US" dirty="0"/>
           </a:p>
@@ -410,7 +410,7 @@
           <a:p>
             <a:fld id="{C732326A-4C88-4AFB-AA5B-5919D81DFF5B}" type="datetimeFigureOut">
               <a:rPr lang="en-US" smtClean="0"/>
-              <a:t>5/24/2022</a:t>
+              <a:t>5/25/22</a:t>
             </a:fld>
             <a:endParaRPr lang="en-US" dirty="0"/>
           </a:p>
@@ -1091,7 +1091,7 @@
             <a:fld id="{B61BEF0D-F0BB-DE4B-95CE-6DB70DBA9567}" type="datetimeFigureOut">
               <a:rPr lang="en-US" smtClean="0"/>
               <a:pPr/>
-              <a:t>5/24/2022</a:t>
+              <a:t>5/25/22</a:t>
             </a:fld>
             <a:endParaRPr lang="en-US" dirty="0"/>
           </a:p>
@@ -1355,7 +1355,7 @@
             <a:fld id="{B61BEF0D-F0BB-DE4B-95CE-6DB70DBA9567}" type="datetimeFigureOut">
               <a:rPr lang="en-US" smtClean="0"/>
               <a:pPr/>
-              <a:t>5/24/2022</a:t>
+              <a:t>5/25/22</a:t>
             </a:fld>
             <a:endParaRPr lang="en-US" dirty="0"/>
           </a:p>
@@ -1592,7 +1592,7 @@
             <a:fld id="{B61BEF0D-F0BB-DE4B-95CE-6DB70DBA9567}" type="datetimeFigureOut">
               <a:rPr lang="en-US" smtClean="0"/>
               <a:pPr/>
-              <a:t>5/24/2022</a:t>
+              <a:t>5/25/22</a:t>
             </a:fld>
             <a:endParaRPr lang="en-US" dirty="0"/>
           </a:p>
@@ -1834,7 +1834,7 @@
             <a:fld id="{B61BEF0D-F0BB-DE4B-95CE-6DB70DBA9567}" type="datetimeFigureOut">
               <a:rPr lang="en-US" smtClean="0"/>
               <a:pPr/>
-              <a:t>5/24/2022</a:t>
+              <a:t>5/25/22</a:t>
             </a:fld>
             <a:endParaRPr lang="en-US" dirty="0"/>
           </a:p>
@@ -2143,7 +2143,7 @@
             <a:fld id="{B61BEF0D-F0BB-DE4B-95CE-6DB70DBA9567}" type="datetimeFigureOut">
               <a:rPr lang="en-US" smtClean="0"/>
               <a:pPr/>
-              <a:t>5/24/2022</a:t>
+              <a:t>5/25/22</a:t>
             </a:fld>
             <a:endParaRPr lang="en-US" dirty="0"/>
           </a:p>
@@ -2447,7 +2447,7 @@
             <a:fld id="{B61BEF0D-F0BB-DE4B-95CE-6DB70DBA9567}" type="datetimeFigureOut">
               <a:rPr lang="en-US" smtClean="0"/>
               <a:pPr/>
-              <a:t>5/24/2022</a:t>
+              <a:t>5/25/22</a:t>
             </a:fld>
             <a:endParaRPr lang="en-US" dirty="0"/>
           </a:p>
@@ -2871,7 +2871,7 @@
             <a:fld id="{B61BEF0D-F0BB-DE4B-95CE-6DB70DBA9567}" type="datetimeFigureOut">
               <a:rPr lang="en-US" smtClean="0"/>
               <a:pPr/>
-              <a:t>5/24/2022</a:t>
+              <a:t>5/25/22</a:t>
             </a:fld>
             <a:endParaRPr lang="en-US" dirty="0"/>
           </a:p>
@@ -2968,7 +2968,7 @@
             <a:fld id="{B61BEF0D-F0BB-DE4B-95CE-6DB70DBA9567}" type="datetimeFigureOut">
               <a:rPr lang="en-US" smtClean="0"/>
               <a:pPr/>
-              <a:t>5/24/2022</a:t>
+              <a:t>5/25/22</a:t>
             </a:fld>
             <a:endParaRPr lang="en-US" dirty="0"/>
           </a:p>
@@ -3132,7 +3132,7 @@
             <a:fld id="{B61BEF0D-F0BB-DE4B-95CE-6DB70DBA9567}" type="datetimeFigureOut">
               <a:rPr lang="en-US" smtClean="0"/>
               <a:pPr/>
-              <a:t>5/24/2022</a:t>
+              <a:t>5/25/22</a:t>
             </a:fld>
             <a:endParaRPr lang="en-US" dirty="0"/>
           </a:p>
@@ -3512,7 +3512,7 @@
             <a:fld id="{B61BEF0D-F0BB-DE4B-95CE-6DB70DBA9567}" type="datetimeFigureOut">
               <a:rPr lang="en-US" smtClean="0"/>
               <a:pPr/>
-              <a:t>5/24/2022</a:t>
+              <a:t>5/25/22</a:t>
             </a:fld>
             <a:endParaRPr lang="en-US" dirty="0"/>
           </a:p>
@@ -3803,7 +3803,7 @@
             <a:fld id="{B61BEF0D-F0BB-DE4B-95CE-6DB70DBA9567}" type="datetimeFigureOut">
               <a:rPr lang="en-US" smtClean="0"/>
               <a:pPr/>
-              <a:t>5/24/2022</a:t>
+              <a:t>5/25/22</a:t>
             </a:fld>
             <a:endParaRPr lang="en-US" dirty="0"/>
           </a:p>
@@ -4016,7 +4016,7 @@
             <a:fld id="{B61BEF0D-F0BB-DE4B-95CE-6DB70DBA9567}" type="datetimeFigureOut">
               <a:rPr lang="en-US" smtClean="0"/>
               <a:pPr/>
-              <a:t>5/24/2022</a:t>
+              <a:t>5/25/22</a:t>
             </a:fld>
             <a:endParaRPr lang="en-US" dirty="0"/>
           </a:p>
@@ -5153,7 +5153,7 @@
           <p:nvPr>
             <p:extLst>
               <p:ext uri="{D42A27DB-BD31-4B8C-83A1-F6EECF244321}">
-                <p14:modId xmlns:p14="http://schemas.microsoft.com/office/powerpoint/2010/main" val="3120661825"/>
+                <p14:modId xmlns:p14="http://schemas.microsoft.com/office/powerpoint/2010/main" val="3768222526"/>
               </p:ext>
             </p:extLst>
           </p:nvPr>
@@ -5455,10 +5455,7 @@
                     <a:bodyPr/>
                     <a:lstStyle/>
                     <a:p>
-                      <a:r>
-                        <a:rPr lang="en-AU" dirty="0"/>
-                        <a:t>Josh</a:t>
-                      </a:r>
+                      <a:endParaRPr lang="en-AU" dirty="0"/>
                     </a:p>
                   </a:txBody>
                   <a:tcPr/>
@@ -5511,7 +5508,10 @@
                     <a:bodyPr/>
                     <a:lstStyle/>
                     <a:p>
-                      <a:endParaRPr lang="en-AU" dirty="0"/>
+                      <a:r>
+                        <a:rPr lang="en-AU" dirty="0"/>
+                        <a:t>Taj</a:t>
+                      </a:r>
                     </a:p>
                   </a:txBody>
                   <a:tcPr/>
@@ -6274,10 +6274,87 @@
         </p:nvSpPr>
         <p:spPr/>
         <p:txBody>
-          <a:bodyPr/>
+          <a:bodyPr>
+            <a:normAutofit fontScale="92500" lnSpcReduction="20000"/>
+          </a:bodyPr>
           <a:lstStyle/>
           <a:p>
-            <a:endParaRPr lang="en-AU"/>
+            <a:pPr marL="0" indent="0">
+              <a:buNone/>
+            </a:pPr>
+            <a:r>
+              <a:rPr lang="en-AU" dirty="0"/>
+              <a:t>Direction Calculator</a:t>
+            </a:r>
+          </a:p>
+          <a:p>
+            <a:r>
+              <a:rPr lang="en-AU" dirty="0"/>
+              <a:t>Access shopper struct for reference distance and angles</a:t>
+            </a:r>
+          </a:p>
+          <a:p>
+            <a:r>
+              <a:rPr lang="en-AU" dirty="0"/>
+              <a:t>Calculate the difference from reference and measured distance/angles</a:t>
+            </a:r>
+          </a:p>
+          <a:p>
+            <a:pPr lvl="1"/>
+            <a:r>
+              <a:rPr lang="en-AU" dirty="0"/>
+              <a:t>Decide whether right or left (angle) forward or back (distance)</a:t>
+            </a:r>
+          </a:p>
+          <a:p>
+            <a:r>
+              <a:rPr lang="en-AU" dirty="0"/>
+              <a:t>Combine distance and angles with direction in one instruction string – to be outputted when queried</a:t>
+            </a:r>
+          </a:p>
+          <a:p>
+            <a:pPr marL="0" indent="0">
+              <a:buNone/>
+            </a:pPr>
+            <a:endParaRPr lang="en-AU" dirty="0"/>
+          </a:p>
+          <a:p>
+            <a:pPr marL="0" indent="0">
+              <a:buNone/>
+            </a:pPr>
+            <a:r>
+              <a:rPr lang="en-AU" dirty="0"/>
+              <a:t>Distance and Angle Geometry</a:t>
+            </a:r>
+          </a:p>
+          <a:p>
+            <a:r>
+              <a:rPr lang="en-AU" dirty="0"/>
+              <a:t>Passed in the edge bounds of the shopper</a:t>
+            </a:r>
+          </a:p>
+          <a:p>
+            <a:r>
+              <a:rPr lang="en-AU" dirty="0"/>
+              <a:t>Using geometry</a:t>
+            </a:r>
+          </a:p>
+          <a:p>
+            <a:pPr lvl="1"/>
+            <a:r>
+              <a:rPr lang="en-AU" dirty="0"/>
+              <a:t>Calculates the distance away the shopper is from the trolley</a:t>
+            </a:r>
+          </a:p>
+          <a:p>
+            <a:pPr lvl="1"/>
+            <a:r>
+              <a:rPr lang="en-AU" dirty="0"/>
+              <a:t>Calculates the angle at which the shopper is from the trolley</a:t>
+            </a:r>
+          </a:p>
+          <a:p>
+            <a:endParaRPr lang="en-AU" dirty="0"/>
           </a:p>
         </p:txBody>
       </p:sp>
@@ -7541,15 +7618,6 @@
           <a:solidFill>
             <a:srgbClr val="FFFFFF"/>
           </a:solidFill>
-          <a:extLst>
-            <a:ext uri="{909E8E84-426E-40DD-AFC4-6F175D3DCCD1}">
-              <a14:hiddenFill xmlns:a14="http://schemas.microsoft.com/office/drawing/2010/main">
-                <a:solidFill>
-                  <a:srgbClr val="FFFFFF"/>
-                </a:solidFill>
-              </a14:hiddenFill>
-            </a:ext>
-          </a:extLst>
         </p:spPr>
       </p:pic>
       <p:sp>

</xml_diff>